<commit_message>
fit curves from 4/28
</commit_message>
<xml_diff>
--- a/maps/TT_subplot_map_fillable.pptx
+++ b/maps/TT_subplot_map_fillable.pptx
@@ -260,7 +260,7 @@
           <a:p>
             <a:fld id="{3EBFF84C-30FA-534C-A298-DE425FBFB86B}" type="datetimeFigureOut">
               <a:rPr lang="en-US" smtClean="0"/>
-              <a:t>5/10/24</a:t>
+              <a:t>5/17/24</a:t>
             </a:fld>
             <a:endParaRPr lang="en-US"/>
           </a:p>
@@ -430,7 +430,7 @@
           <a:p>
             <a:fld id="{3EBFF84C-30FA-534C-A298-DE425FBFB86B}" type="datetimeFigureOut">
               <a:rPr lang="en-US" smtClean="0"/>
-              <a:t>5/10/24</a:t>
+              <a:t>5/17/24</a:t>
             </a:fld>
             <a:endParaRPr lang="en-US"/>
           </a:p>
@@ -610,7 +610,7 @@
           <a:p>
             <a:fld id="{3EBFF84C-30FA-534C-A298-DE425FBFB86B}" type="datetimeFigureOut">
               <a:rPr lang="en-US" smtClean="0"/>
-              <a:t>5/10/24</a:t>
+              <a:t>5/17/24</a:t>
             </a:fld>
             <a:endParaRPr lang="en-US"/>
           </a:p>
@@ -780,7 +780,7 @@
           <a:p>
             <a:fld id="{3EBFF84C-30FA-534C-A298-DE425FBFB86B}" type="datetimeFigureOut">
               <a:rPr lang="en-US" smtClean="0"/>
-              <a:t>5/10/24</a:t>
+              <a:t>5/17/24</a:t>
             </a:fld>
             <a:endParaRPr lang="en-US"/>
           </a:p>
@@ -1024,7 +1024,7 @@
           <a:p>
             <a:fld id="{3EBFF84C-30FA-534C-A298-DE425FBFB86B}" type="datetimeFigureOut">
               <a:rPr lang="en-US" smtClean="0"/>
-              <a:t>5/10/24</a:t>
+              <a:t>5/17/24</a:t>
             </a:fld>
             <a:endParaRPr lang="en-US"/>
           </a:p>
@@ -1256,7 +1256,7 @@
           <a:p>
             <a:fld id="{3EBFF84C-30FA-534C-A298-DE425FBFB86B}" type="datetimeFigureOut">
               <a:rPr lang="en-US" smtClean="0"/>
-              <a:t>5/10/24</a:t>
+              <a:t>5/17/24</a:t>
             </a:fld>
             <a:endParaRPr lang="en-US"/>
           </a:p>
@@ -1623,7 +1623,7 @@
           <a:p>
             <a:fld id="{3EBFF84C-30FA-534C-A298-DE425FBFB86B}" type="datetimeFigureOut">
               <a:rPr lang="en-US" smtClean="0"/>
-              <a:t>5/10/24</a:t>
+              <a:t>5/17/24</a:t>
             </a:fld>
             <a:endParaRPr lang="en-US"/>
           </a:p>
@@ -1741,7 +1741,7 @@
           <a:p>
             <a:fld id="{3EBFF84C-30FA-534C-A298-DE425FBFB86B}" type="datetimeFigureOut">
               <a:rPr lang="en-US" smtClean="0"/>
-              <a:t>5/10/24</a:t>
+              <a:t>5/17/24</a:t>
             </a:fld>
             <a:endParaRPr lang="en-US"/>
           </a:p>
@@ -1836,7 +1836,7 @@
           <a:p>
             <a:fld id="{3EBFF84C-30FA-534C-A298-DE425FBFB86B}" type="datetimeFigureOut">
               <a:rPr lang="en-US" smtClean="0"/>
-              <a:t>5/10/24</a:t>
+              <a:t>5/17/24</a:t>
             </a:fld>
             <a:endParaRPr lang="en-US"/>
           </a:p>
@@ -2113,7 +2113,7 @@
           <a:p>
             <a:fld id="{3EBFF84C-30FA-534C-A298-DE425FBFB86B}" type="datetimeFigureOut">
               <a:rPr lang="en-US" smtClean="0"/>
-              <a:t>5/10/24</a:t>
+              <a:t>5/17/24</a:t>
             </a:fld>
             <a:endParaRPr lang="en-US"/>
           </a:p>
@@ -2370,7 +2370,7 @@
           <a:p>
             <a:fld id="{3EBFF84C-30FA-534C-A298-DE425FBFB86B}" type="datetimeFigureOut">
               <a:rPr lang="en-US" smtClean="0"/>
-              <a:t>5/10/24</a:t>
+              <a:t>5/17/24</a:t>
             </a:fld>
             <a:endParaRPr lang="en-US"/>
           </a:p>
@@ -2583,7 +2583,7 @@
           <a:p>
             <a:fld id="{3EBFF84C-30FA-534C-A298-DE425FBFB86B}" type="datetimeFigureOut">
               <a:rPr lang="en-US" smtClean="0"/>
-              <a:t>5/10/24</a:t>
+              <a:t>5/17/24</a:t>
             </a:fld>
             <a:endParaRPr lang="en-US"/>
           </a:p>
@@ -14577,21 +14577,21 @@
         <p:spPr>
           <a:xfrm>
             <a:off x="8371567" y="1504238"/>
-            <a:ext cx="2525050" cy="1200329"/>
-          </a:xfrm>
-          <a:prstGeom prst="rect">
-            <a:avLst/>
-          </a:prstGeom>
-          <a:noFill/>
-        </p:spPr>
-        <p:txBody>
-          <a:bodyPr wrap="none" rtlCol="0">
-            <a:spAutoFit/>
-          </a:bodyPr>
-          <a:lstStyle/>
-          <a:p>
-            <a:r>
-              <a:rPr lang="en-US" sz="1200" dirty="0">
+            <a:ext cx="2912977" cy="2462213"/>
+          </a:xfrm>
+          <a:prstGeom prst="rect">
+            <a:avLst/>
+          </a:prstGeom>
+          <a:noFill/>
+        </p:spPr>
+        <p:txBody>
+          <a:bodyPr wrap="none" rtlCol="0">
+            <a:spAutoFit/>
+          </a:bodyPr>
+          <a:lstStyle/>
+          <a:p>
+            <a:r>
+              <a:rPr lang="en-US" sz="1400" dirty="0">
                 <a:latin typeface="Arial" panose="020B0604020202020204" pitchFamily="34" charset="0"/>
                 <a:cs typeface="Arial" panose="020B0604020202020204" pitchFamily="34" charset="0"/>
               </a:rPr>
@@ -14599,8 +14599,14 @@
             </a:r>
           </a:p>
           <a:p>
-            <a:r>
-              <a:rPr lang="en-US" sz="1200" dirty="0">
+            <a:endParaRPr lang="en-US" sz="1400" dirty="0">
+              <a:latin typeface="Arial" panose="020B0604020202020204" pitchFamily="34" charset="0"/>
+              <a:cs typeface="Arial" panose="020B0604020202020204" pitchFamily="34" charset="0"/>
+            </a:endParaRPr>
+          </a:p>
+          <a:p>
+            <a:r>
+              <a:rPr lang="en-US" sz="1400" dirty="0">
                 <a:latin typeface="Arial" panose="020B0604020202020204" pitchFamily="34" charset="0"/>
                 <a:cs typeface="Arial" panose="020B0604020202020204" pitchFamily="34" charset="0"/>
               </a:rPr>
@@ -14608,8 +14614,14 @@
             </a:r>
           </a:p>
           <a:p>
-            <a:r>
-              <a:rPr lang="en-US" sz="1200" dirty="0">
+            <a:endParaRPr lang="en-US" sz="1400" dirty="0">
+              <a:latin typeface="Arial" panose="020B0604020202020204" pitchFamily="34" charset="0"/>
+              <a:cs typeface="Arial" panose="020B0604020202020204" pitchFamily="34" charset="0"/>
+            </a:endParaRPr>
+          </a:p>
+          <a:p>
+            <a:r>
+              <a:rPr lang="en-US" sz="1400" dirty="0">
                 <a:latin typeface="Arial" panose="020B0604020202020204" pitchFamily="34" charset="0"/>
                 <a:cs typeface="Arial" panose="020B0604020202020204" pitchFamily="34" charset="0"/>
               </a:rPr>
@@ -14617,8 +14629,14 @@
             </a:r>
           </a:p>
           <a:p>
-            <a:r>
-              <a:rPr lang="en-US" sz="1200" dirty="0">
+            <a:endParaRPr lang="en-US" sz="1400" dirty="0">
+              <a:latin typeface="Arial" panose="020B0604020202020204" pitchFamily="34" charset="0"/>
+              <a:cs typeface="Arial" panose="020B0604020202020204" pitchFamily="34" charset="0"/>
+            </a:endParaRPr>
+          </a:p>
+          <a:p>
+            <a:r>
+              <a:rPr lang="en-US" sz="1400" dirty="0">
                 <a:latin typeface="Arial" panose="020B0604020202020204" pitchFamily="34" charset="0"/>
                 <a:cs typeface="Arial" panose="020B0604020202020204" pitchFamily="34" charset="0"/>
               </a:rPr>
@@ -14626,8 +14644,14 @@
             </a:r>
           </a:p>
           <a:p>
-            <a:r>
-              <a:rPr lang="en-US" sz="1200" dirty="0">
+            <a:endParaRPr lang="en-US" sz="1400" dirty="0">
+              <a:latin typeface="Arial" panose="020B0604020202020204" pitchFamily="34" charset="0"/>
+              <a:cs typeface="Arial" panose="020B0604020202020204" pitchFamily="34" charset="0"/>
+            </a:endParaRPr>
+          </a:p>
+          <a:p>
+            <a:r>
+              <a:rPr lang="en-US" sz="1400" dirty="0">
                 <a:latin typeface="Arial" panose="020B0604020202020204" pitchFamily="34" charset="0"/>
                 <a:cs typeface="Arial" panose="020B0604020202020204" pitchFamily="34" charset="0"/>
               </a:rPr>
@@ -14635,8 +14659,14 @@
             </a:r>
           </a:p>
           <a:p>
-            <a:r>
-              <a:rPr lang="en-US" sz="1200" dirty="0">
+            <a:endParaRPr lang="en-US" sz="1400" dirty="0">
+              <a:latin typeface="Arial" panose="020B0604020202020204" pitchFamily="34" charset="0"/>
+              <a:cs typeface="Arial" panose="020B0604020202020204" pitchFamily="34" charset="0"/>
+            </a:endParaRPr>
+          </a:p>
+          <a:p>
+            <a:r>
+              <a:rPr lang="en-US" sz="1400" dirty="0">
                 <a:latin typeface="Arial" panose="020B0604020202020204" pitchFamily="34" charset="0"/>
                 <a:cs typeface="Arial" panose="020B0604020202020204" pitchFamily="34" charset="0"/>
               </a:rPr>
@@ -20089,8 +20119,8 @@
         </p:nvSpPr>
         <p:spPr>
           <a:xfrm>
-            <a:off x="2549043" y="1550639"/>
-            <a:ext cx="466795" cy="246221"/>
+            <a:off x="2486526" y="1550639"/>
+            <a:ext cx="591829" cy="353943"/>
           </a:xfrm>
           <a:prstGeom prst="rect">
             <a:avLst/>
@@ -20110,6 +20140,16 @@
                 <a:cs typeface="Arial" panose="020B0604020202020204" pitchFamily="34" charset="0"/>
               </a:rPr>
               <a:t>4250</a:t>
+            </a:r>
+          </a:p>
+          <a:p>
+            <a:pPr algn="ctr"/>
+            <a:r>
+              <a:rPr lang="en-US" sz="700" dirty="0">
+                <a:latin typeface="Arial" panose="020B0604020202020204" pitchFamily="34" charset="0"/>
+                <a:cs typeface="Arial" panose="020B0604020202020204" pitchFamily="34" charset="0"/>
+              </a:rPr>
+              <a:t>TT24_112</a:t>
             </a:r>
           </a:p>
         </p:txBody>
@@ -20255,8 +20295,8 @@
         </p:nvSpPr>
         <p:spPr>
           <a:xfrm>
-            <a:off x="4899955" y="1136386"/>
-            <a:ext cx="466795" cy="246221"/>
+            <a:off x="4813162" y="1071650"/>
+            <a:ext cx="591829" cy="353943"/>
           </a:xfrm>
           <a:prstGeom prst="rect">
             <a:avLst/>
@@ -20276,6 +20316,16 @@
                 <a:cs typeface="Arial" panose="020B0604020202020204" pitchFamily="34" charset="0"/>
               </a:rPr>
               <a:t>2310</a:t>
+            </a:r>
+          </a:p>
+          <a:p>
+            <a:pPr algn="ctr"/>
+            <a:r>
+              <a:rPr lang="en-US" sz="700" dirty="0">
+                <a:latin typeface="Arial" panose="020B0604020202020204" pitchFamily="34" charset="0"/>
+                <a:cs typeface="Arial" panose="020B0604020202020204" pitchFamily="34" charset="0"/>
+              </a:rPr>
+              <a:t>TT24_212</a:t>
             </a:r>
           </a:p>
         </p:txBody>
@@ -21029,21 +21079,21 @@
         <p:spPr>
           <a:xfrm>
             <a:off x="8371567" y="1504238"/>
-            <a:ext cx="2525050" cy="830997"/>
-          </a:xfrm>
-          <a:prstGeom prst="rect">
-            <a:avLst/>
-          </a:prstGeom>
-          <a:noFill/>
-        </p:spPr>
-        <p:txBody>
-          <a:bodyPr wrap="none" rtlCol="0">
-            <a:spAutoFit/>
-          </a:bodyPr>
-          <a:lstStyle/>
-          <a:p>
-            <a:r>
-              <a:rPr lang="en-US" sz="1200" dirty="0">
+            <a:ext cx="2912977" cy="1600438"/>
+          </a:xfrm>
+          <a:prstGeom prst="rect">
+            <a:avLst/>
+          </a:prstGeom>
+          <a:noFill/>
+        </p:spPr>
+        <p:txBody>
+          <a:bodyPr wrap="none" rtlCol="0">
+            <a:spAutoFit/>
+          </a:bodyPr>
+          <a:lstStyle/>
+          <a:p>
+            <a:r>
+              <a:rPr lang="en-US" sz="1400" dirty="0">
                 <a:latin typeface="Arial" panose="020B0604020202020204" pitchFamily="34" charset="0"/>
                 <a:cs typeface="Arial" panose="020B0604020202020204" pitchFamily="34" charset="0"/>
               </a:rPr>
@@ -21051,8 +21101,14 @@
             </a:r>
           </a:p>
           <a:p>
-            <a:r>
-              <a:rPr lang="en-US" sz="1200" dirty="0">
+            <a:endParaRPr lang="en-US" sz="1400" dirty="0">
+              <a:latin typeface="Arial" panose="020B0604020202020204" pitchFamily="34" charset="0"/>
+              <a:cs typeface="Arial" panose="020B0604020202020204" pitchFamily="34" charset="0"/>
+            </a:endParaRPr>
+          </a:p>
+          <a:p>
+            <a:r>
+              <a:rPr lang="en-US" sz="1400" dirty="0">
                 <a:latin typeface="Arial" panose="020B0604020202020204" pitchFamily="34" charset="0"/>
                 <a:cs typeface="Arial" panose="020B0604020202020204" pitchFamily="34" charset="0"/>
               </a:rPr>
@@ -21060,8 +21116,14 @@
             </a:r>
           </a:p>
           <a:p>
-            <a:r>
-              <a:rPr lang="en-US" sz="1200" dirty="0">
+            <a:endParaRPr lang="en-US" sz="1400" dirty="0">
+              <a:latin typeface="Arial" panose="020B0604020202020204" pitchFamily="34" charset="0"/>
+              <a:cs typeface="Arial" panose="020B0604020202020204" pitchFamily="34" charset="0"/>
+            </a:endParaRPr>
+          </a:p>
+          <a:p>
+            <a:r>
+              <a:rPr lang="en-US" sz="1400" dirty="0">
                 <a:latin typeface="Arial" panose="020B0604020202020204" pitchFamily="34" charset="0"/>
                 <a:cs typeface="Arial" panose="020B0604020202020204" pitchFamily="34" charset="0"/>
               </a:rPr>
@@ -21069,8 +21131,14 @@
             </a:r>
           </a:p>
           <a:p>
-            <a:r>
-              <a:rPr lang="en-US" sz="1200" dirty="0">
+            <a:endParaRPr lang="en-US" sz="1400" dirty="0">
+              <a:latin typeface="Arial" panose="020B0604020202020204" pitchFamily="34" charset="0"/>
+              <a:cs typeface="Arial" panose="020B0604020202020204" pitchFamily="34" charset="0"/>
+            </a:endParaRPr>
+          </a:p>
+          <a:p>
+            <a:r>
+              <a:rPr lang="en-US" sz="1400" dirty="0">
                 <a:latin typeface="Arial" panose="020B0604020202020204" pitchFamily="34" charset="0"/>
                 <a:cs typeface="Arial" panose="020B0604020202020204" pitchFamily="34" charset="0"/>
               </a:rPr>
@@ -21118,6 +21186,45 @@
             <a:r>
               <a:rPr lang="en-US" dirty="0"/>
               <a:t>=30</a:t>
+            </a:r>
+          </a:p>
+        </p:txBody>
+      </p:sp>
+      <p:sp>
+        <p:nvSpPr>
+          <p:cNvPr id="154" name="TextBox 153">
+            <a:extLst>
+              <a:ext uri="{FF2B5EF4-FFF2-40B4-BE49-F238E27FC236}">
+                <a16:creationId xmlns:a16="http://schemas.microsoft.com/office/drawing/2014/main" id="{0FF9A71F-2DB7-FFCB-7D5E-2DFE35828C6C}"/>
+              </a:ext>
+            </a:extLst>
+          </p:cNvPr>
+          <p:cNvSpPr txBox="1"/>
+          <p:nvPr/>
+        </p:nvSpPr>
+        <p:spPr>
+          <a:xfrm>
+            <a:off x="5743083" y="1167375"/>
+            <a:ext cx="591829" cy="200055"/>
+          </a:xfrm>
+          <a:prstGeom prst="rect">
+            <a:avLst/>
+          </a:prstGeom>
+          <a:noFill/>
+        </p:spPr>
+        <p:txBody>
+          <a:bodyPr wrap="none" rtlCol="0">
+            <a:spAutoFit/>
+          </a:bodyPr>
+          <a:lstStyle/>
+          <a:p>
+            <a:pPr algn="ctr"/>
+            <a:r>
+              <a:rPr lang="en-US" sz="700" dirty="0">
+                <a:latin typeface="Arial" panose="020B0604020202020204" pitchFamily="34" charset="0"/>
+                <a:cs typeface="Arial" panose="020B0604020202020204" pitchFamily="34" charset="0"/>
+              </a:rPr>
+              <a:t>TT24_210</a:t>
             </a:r>
           </a:p>
         </p:txBody>
@@ -27458,21 +27565,21 @@
         <p:spPr>
           <a:xfrm>
             <a:off x="8371567" y="1504238"/>
-            <a:ext cx="2525050" cy="2677656"/>
-          </a:xfrm>
-          <a:prstGeom prst="rect">
-            <a:avLst/>
-          </a:prstGeom>
-          <a:noFill/>
-        </p:spPr>
-        <p:txBody>
-          <a:bodyPr wrap="none" rtlCol="0">
-            <a:spAutoFit/>
-          </a:bodyPr>
-          <a:lstStyle/>
-          <a:p>
-            <a:r>
-              <a:rPr lang="en-US" sz="1200" dirty="0">
+            <a:ext cx="2912977" cy="4616648"/>
+          </a:xfrm>
+          <a:prstGeom prst="rect">
+            <a:avLst/>
+          </a:prstGeom>
+          <a:noFill/>
+        </p:spPr>
+        <p:txBody>
+          <a:bodyPr wrap="none" rtlCol="0">
+            <a:spAutoFit/>
+          </a:bodyPr>
+          <a:lstStyle/>
+          <a:p>
+            <a:r>
+              <a:rPr lang="en-US" sz="1400" dirty="0">
                 <a:latin typeface="Arial" panose="020B0604020202020204" pitchFamily="34" charset="0"/>
                 <a:cs typeface="Arial" panose="020B0604020202020204" pitchFamily="34" charset="0"/>
               </a:rPr>
@@ -27480,98 +27587,140 @@
             </a:r>
           </a:p>
           <a:p>
-            <a:r>
-              <a:rPr lang="en-US" sz="1200" dirty="0">
-                <a:latin typeface="Arial" panose="020B0604020202020204" pitchFamily="34" charset="0"/>
-                <a:cs typeface="Arial" panose="020B0604020202020204" pitchFamily="34" charset="0"/>
-              </a:rPr>
-              <a:t>4547 -&gt; in center of all quadrats</a:t>
-            </a:r>
-          </a:p>
-          <a:p>
-            <a:r>
-              <a:rPr lang="en-US" sz="1200" dirty="0">
-                <a:latin typeface="Arial" panose="020B0604020202020204" pitchFamily="34" charset="0"/>
-                <a:cs typeface="Arial" panose="020B0604020202020204" pitchFamily="34" charset="0"/>
-              </a:rPr>
-              <a:t>614 -&gt; in center of all quadrats</a:t>
-            </a:r>
-          </a:p>
-          <a:p>
-            <a:r>
-              <a:rPr lang="en-US" sz="1200" dirty="0">
-                <a:latin typeface="Arial" panose="020B0604020202020204" pitchFamily="34" charset="0"/>
-                <a:cs typeface="Arial" panose="020B0604020202020204" pitchFamily="34" charset="0"/>
-              </a:rPr>
-              <a:t>3077 -&gt; between quadrats 1 and 2</a:t>
-            </a:r>
-          </a:p>
-          <a:p>
-            <a:r>
-              <a:rPr lang="en-US" sz="1200" dirty="0">
-                <a:latin typeface="Arial" panose="020B0604020202020204" pitchFamily="34" charset="0"/>
-                <a:cs typeface="Arial" panose="020B0604020202020204" pitchFamily="34" charset="0"/>
-              </a:rPr>
-              <a:t>4990 -&gt; between quadrats 1 and 3</a:t>
-            </a:r>
-          </a:p>
-          <a:p>
-            <a:r>
-              <a:rPr lang="en-US" sz="1200" dirty="0">
-                <a:latin typeface="Arial" panose="020B0604020202020204" pitchFamily="34" charset="0"/>
-                <a:cs typeface="Arial" panose="020B0604020202020204" pitchFamily="34" charset="0"/>
-              </a:rPr>
-              <a:t>6875 -&gt; in center of all quadrats</a:t>
-            </a:r>
-          </a:p>
-          <a:p>
-            <a:r>
-              <a:rPr lang="en-US" sz="1200" dirty="0">
-                <a:latin typeface="Arial" panose="020B0604020202020204" pitchFamily="34" charset="0"/>
-                <a:cs typeface="Arial" panose="020B0604020202020204" pitchFamily="34" charset="0"/>
-              </a:rPr>
-              <a:t>4109 -&gt; between quadrats 1 and 2</a:t>
-            </a:r>
-          </a:p>
-          <a:p>
-            <a:r>
-              <a:rPr lang="en-US" sz="1200" dirty="0">
-                <a:latin typeface="Arial" panose="020B0604020202020204" pitchFamily="34" charset="0"/>
-                <a:cs typeface="Arial" panose="020B0604020202020204" pitchFamily="34" charset="0"/>
-              </a:rPr>
-              <a:t>2988 -&gt; between quadrats 1 and 2</a:t>
-            </a:r>
-          </a:p>
-          <a:p>
-            <a:endParaRPr lang="en-US" sz="1200" dirty="0">
+            <a:endParaRPr lang="en-US" sz="1400" dirty="0">
               <a:latin typeface="Arial" panose="020B0604020202020204" pitchFamily="34" charset="0"/>
               <a:cs typeface="Arial" panose="020B0604020202020204" pitchFamily="34" charset="0"/>
             </a:endParaRPr>
           </a:p>
           <a:p>
-            <a:endParaRPr lang="en-US" sz="1200" dirty="0">
+            <a:r>
+              <a:rPr lang="en-US" sz="1400" dirty="0">
+                <a:latin typeface="Arial" panose="020B0604020202020204" pitchFamily="34" charset="0"/>
+                <a:cs typeface="Arial" panose="020B0604020202020204" pitchFamily="34" charset="0"/>
+              </a:rPr>
+              <a:t>4547 -&gt; in center of all quadrats</a:t>
+            </a:r>
+          </a:p>
+          <a:p>
+            <a:endParaRPr lang="en-US" sz="1400" dirty="0">
               <a:latin typeface="Arial" panose="020B0604020202020204" pitchFamily="34" charset="0"/>
               <a:cs typeface="Arial" panose="020B0604020202020204" pitchFamily="34" charset="0"/>
             </a:endParaRPr>
           </a:p>
           <a:p>
             <a:r>
-              <a:rPr lang="en-US" sz="1200" dirty="0">
-                <a:latin typeface="Arial" panose="020B0604020202020204" pitchFamily="34" charset="0"/>
-                <a:cs typeface="Arial" panose="020B0604020202020204" pitchFamily="34" charset="0"/>
-              </a:rPr>
-              <a:t>flag8 = polka dot flag</a:t>
-            </a:r>
-          </a:p>
-          <a:p>
-            <a:endParaRPr lang="en-US" sz="1200" dirty="0">
+              <a:rPr lang="en-US" sz="1400" dirty="0">
+                <a:latin typeface="Arial" panose="020B0604020202020204" pitchFamily="34" charset="0"/>
+                <a:cs typeface="Arial" panose="020B0604020202020204" pitchFamily="34" charset="0"/>
+              </a:rPr>
+              <a:t>614 -&gt; in center of all quadrats</a:t>
+            </a:r>
+          </a:p>
+          <a:p>
+            <a:endParaRPr lang="en-US" sz="1400" dirty="0">
               <a:latin typeface="Arial" panose="020B0604020202020204" pitchFamily="34" charset="0"/>
               <a:cs typeface="Arial" panose="020B0604020202020204" pitchFamily="34" charset="0"/>
             </a:endParaRPr>
           </a:p>
           <a:p>
             <a:r>
-              <a:rPr lang="en-US" sz="1200" dirty="0">
+              <a:rPr lang="en-US" sz="1400" dirty="0">
+                <a:latin typeface="Arial" panose="020B0604020202020204" pitchFamily="34" charset="0"/>
+                <a:cs typeface="Arial" panose="020B0604020202020204" pitchFamily="34" charset="0"/>
+              </a:rPr>
+              <a:t>3077 -&gt; between quadrats 1 and 2</a:t>
+            </a:r>
+          </a:p>
+          <a:p>
+            <a:endParaRPr lang="en-US" sz="1400" dirty="0">
+              <a:latin typeface="Arial" panose="020B0604020202020204" pitchFamily="34" charset="0"/>
+              <a:cs typeface="Arial" panose="020B0604020202020204" pitchFamily="34" charset="0"/>
+            </a:endParaRPr>
+          </a:p>
+          <a:p>
+            <a:r>
+              <a:rPr lang="en-US" sz="1400" dirty="0">
+                <a:latin typeface="Arial" panose="020B0604020202020204" pitchFamily="34" charset="0"/>
+                <a:cs typeface="Arial" panose="020B0604020202020204" pitchFamily="34" charset="0"/>
+              </a:rPr>
+              <a:t>4990 -&gt; between quadrats 1 and 3</a:t>
+            </a:r>
+          </a:p>
+          <a:p>
+            <a:endParaRPr lang="en-US" sz="1400" dirty="0">
+              <a:latin typeface="Arial" panose="020B0604020202020204" pitchFamily="34" charset="0"/>
+              <a:cs typeface="Arial" panose="020B0604020202020204" pitchFamily="34" charset="0"/>
+            </a:endParaRPr>
+          </a:p>
+          <a:p>
+            <a:r>
+              <a:rPr lang="en-US" sz="1400" dirty="0">
+                <a:latin typeface="Arial" panose="020B0604020202020204" pitchFamily="34" charset="0"/>
+                <a:cs typeface="Arial" panose="020B0604020202020204" pitchFamily="34" charset="0"/>
+              </a:rPr>
+              <a:t>6875 -&gt; in center of all quadrats</a:t>
+            </a:r>
+          </a:p>
+          <a:p>
+            <a:endParaRPr lang="en-US" sz="1400" dirty="0">
+              <a:latin typeface="Arial" panose="020B0604020202020204" pitchFamily="34" charset="0"/>
+              <a:cs typeface="Arial" panose="020B0604020202020204" pitchFamily="34" charset="0"/>
+            </a:endParaRPr>
+          </a:p>
+          <a:p>
+            <a:r>
+              <a:rPr lang="en-US" sz="1400" dirty="0">
+                <a:latin typeface="Arial" panose="020B0604020202020204" pitchFamily="34" charset="0"/>
+                <a:cs typeface="Arial" panose="020B0604020202020204" pitchFamily="34" charset="0"/>
+              </a:rPr>
+              <a:t>4109 -&gt; between quadrats 1 and 2</a:t>
+            </a:r>
+          </a:p>
+          <a:p>
+            <a:endParaRPr lang="en-US" sz="1400" dirty="0">
+              <a:latin typeface="Arial" panose="020B0604020202020204" pitchFamily="34" charset="0"/>
+              <a:cs typeface="Arial" panose="020B0604020202020204" pitchFamily="34" charset="0"/>
+            </a:endParaRPr>
+          </a:p>
+          <a:p>
+            <a:r>
+              <a:rPr lang="en-US" sz="1400" dirty="0">
+                <a:latin typeface="Arial" panose="020B0604020202020204" pitchFamily="34" charset="0"/>
+                <a:cs typeface="Arial" panose="020B0604020202020204" pitchFamily="34" charset="0"/>
+              </a:rPr>
+              <a:t>2988 -&gt; between quadrats 1 and 2</a:t>
+            </a:r>
+          </a:p>
+          <a:p>
+            <a:endParaRPr lang="en-US" sz="1400" dirty="0">
+              <a:latin typeface="Arial" panose="020B0604020202020204" pitchFamily="34" charset="0"/>
+              <a:cs typeface="Arial" panose="020B0604020202020204" pitchFamily="34" charset="0"/>
+            </a:endParaRPr>
+          </a:p>
+          <a:p>
+            <a:endParaRPr lang="en-US" sz="1400" dirty="0">
+              <a:latin typeface="Arial" panose="020B0604020202020204" pitchFamily="34" charset="0"/>
+              <a:cs typeface="Arial" panose="020B0604020202020204" pitchFamily="34" charset="0"/>
+            </a:endParaRPr>
+          </a:p>
+          <a:p>
+            <a:r>
+              <a:rPr lang="en-US" sz="1400" dirty="0">
+                <a:latin typeface="Arial" panose="020B0604020202020204" pitchFamily="34" charset="0"/>
+                <a:cs typeface="Arial" panose="020B0604020202020204" pitchFamily="34" charset="0"/>
+              </a:rPr>
+              <a:t>flag8 = polka dot flag</a:t>
+            </a:r>
+          </a:p>
+          <a:p>
+            <a:endParaRPr lang="en-US" sz="1400" dirty="0">
+              <a:latin typeface="Arial" panose="020B0604020202020204" pitchFamily="34" charset="0"/>
+              <a:cs typeface="Arial" panose="020B0604020202020204" pitchFamily="34" charset="0"/>
+            </a:endParaRPr>
+          </a:p>
+          <a:p>
+            <a:r>
+              <a:rPr lang="en-US" sz="1400" dirty="0">
                 <a:latin typeface="Arial" panose="020B0604020202020204" pitchFamily="34" charset="0"/>
                 <a:cs typeface="Arial" panose="020B0604020202020204" pitchFamily="34" charset="0"/>
               </a:rPr>
@@ -27580,7 +27729,7 @@
           </a:p>
           <a:p>
             <a:r>
-              <a:rPr lang="en-US" sz="1200" dirty="0">
+              <a:rPr lang="en-US" sz="1400" dirty="0">
                 <a:latin typeface="Arial" panose="020B0604020202020204" pitchFamily="34" charset="0"/>
                 <a:cs typeface="Arial" panose="020B0604020202020204" pitchFamily="34" charset="0"/>
               </a:rPr>
@@ -33779,21 +33928,21 @@
         <p:spPr>
           <a:xfrm>
             <a:off x="8371567" y="1504238"/>
-            <a:ext cx="2525050" cy="461665"/>
-          </a:xfrm>
-          <a:prstGeom prst="rect">
-            <a:avLst/>
-          </a:prstGeom>
-          <a:noFill/>
-        </p:spPr>
-        <p:txBody>
-          <a:bodyPr wrap="none" rtlCol="0">
-            <a:spAutoFit/>
-          </a:bodyPr>
-          <a:lstStyle/>
-          <a:p>
-            <a:r>
-              <a:rPr lang="en-US" sz="1200" dirty="0">
+            <a:ext cx="2912977" cy="738664"/>
+          </a:xfrm>
+          <a:prstGeom prst="rect">
+            <a:avLst/>
+          </a:prstGeom>
+          <a:noFill/>
+        </p:spPr>
+        <p:txBody>
+          <a:bodyPr wrap="none" rtlCol="0">
+            <a:spAutoFit/>
+          </a:bodyPr>
+          <a:lstStyle/>
+          <a:p>
+            <a:r>
+              <a:rPr lang="en-US" sz="1400" dirty="0">
                 <a:latin typeface="Arial" panose="020B0604020202020204" pitchFamily="34" charset="0"/>
                 <a:cs typeface="Arial" panose="020B0604020202020204" pitchFamily="34" charset="0"/>
               </a:rPr>
@@ -33801,8 +33950,14 @@
             </a:r>
           </a:p>
           <a:p>
-            <a:r>
-              <a:rPr lang="en-US" sz="1200" dirty="0">
+            <a:endParaRPr lang="en-US" sz="1400" dirty="0">
+              <a:latin typeface="Arial" panose="020B0604020202020204" pitchFamily="34" charset="0"/>
+              <a:cs typeface="Arial" panose="020B0604020202020204" pitchFamily="34" charset="0"/>
+            </a:endParaRPr>
+          </a:p>
+          <a:p>
+            <a:r>
+              <a:rPr lang="en-US" sz="1400" dirty="0">
                 <a:latin typeface="Arial" panose="020B0604020202020204" pitchFamily="34" charset="0"/>
                 <a:cs typeface="Arial" panose="020B0604020202020204" pitchFamily="34" charset="0"/>
               </a:rPr>
@@ -40352,21 +40507,21 @@
         <p:spPr>
           <a:xfrm>
             <a:off x="8371567" y="1504238"/>
-            <a:ext cx="2525050" cy="3231654"/>
-          </a:xfrm>
-          <a:prstGeom prst="rect">
-            <a:avLst/>
-          </a:prstGeom>
-          <a:noFill/>
-        </p:spPr>
-        <p:txBody>
-          <a:bodyPr wrap="none" rtlCol="0">
-            <a:spAutoFit/>
-          </a:bodyPr>
-          <a:lstStyle/>
-          <a:p>
-            <a:r>
-              <a:rPr lang="en-US" sz="1200" dirty="0">
+            <a:ext cx="2912977" cy="5909310"/>
+          </a:xfrm>
+          <a:prstGeom prst="rect">
+            <a:avLst/>
+          </a:prstGeom>
+          <a:noFill/>
+        </p:spPr>
+        <p:txBody>
+          <a:bodyPr wrap="none" rtlCol="0">
+            <a:spAutoFit/>
+          </a:bodyPr>
+          <a:lstStyle/>
+          <a:p>
+            <a:r>
+              <a:rPr lang="en-US" sz="1400" dirty="0">
                 <a:latin typeface="Arial" panose="020B0604020202020204" pitchFamily="34" charset="0"/>
                 <a:cs typeface="Arial" panose="020B0604020202020204" pitchFamily="34" charset="0"/>
               </a:rPr>
@@ -40374,134 +40529,194 @@
             </a:r>
           </a:p>
           <a:p>
-            <a:r>
-              <a:rPr lang="en-US" sz="1200" dirty="0">
-                <a:latin typeface="Arial" panose="020B0604020202020204" pitchFamily="34" charset="0"/>
-                <a:cs typeface="Arial" panose="020B0604020202020204" pitchFamily="34" charset="0"/>
-              </a:rPr>
-              <a:t>4712 -&gt; in center of all quadrats</a:t>
-            </a:r>
-          </a:p>
-          <a:p>
-            <a:r>
-              <a:rPr lang="en-US" sz="1200" dirty="0">
-                <a:latin typeface="Arial" panose="020B0604020202020204" pitchFamily="34" charset="0"/>
-                <a:cs typeface="Arial" panose="020B0604020202020204" pitchFamily="34" charset="0"/>
-              </a:rPr>
-              <a:t>5267 -&gt; between quadrats 1 and 3</a:t>
-            </a:r>
-          </a:p>
-          <a:p>
-            <a:r>
-              <a:rPr lang="en-US" sz="1200" dirty="0">
-                <a:latin typeface="Arial" panose="020B0604020202020204" pitchFamily="34" charset="0"/>
-                <a:cs typeface="Arial" panose="020B0604020202020204" pitchFamily="34" charset="0"/>
-              </a:rPr>
-              <a:t>5641 -&gt; between quadrats 2 and 4</a:t>
-            </a:r>
-          </a:p>
-          <a:p>
-            <a:r>
-              <a:rPr lang="en-US" sz="1200" dirty="0">
-                <a:latin typeface="Arial" panose="020B0604020202020204" pitchFamily="34" charset="0"/>
-                <a:cs typeface="Arial" panose="020B0604020202020204" pitchFamily="34" charset="0"/>
-              </a:rPr>
-              <a:t>3305 -&gt; between quadrats 1 and 3</a:t>
-            </a:r>
-          </a:p>
-          <a:p>
-            <a:r>
-              <a:rPr lang="en-US" sz="1200" dirty="0">
-                <a:latin typeface="Arial" panose="020B0604020202020204" pitchFamily="34" charset="0"/>
-                <a:cs typeface="Arial" panose="020B0604020202020204" pitchFamily="34" charset="0"/>
-              </a:rPr>
-              <a:t>5403 -&gt; in center of all quadrats</a:t>
-            </a:r>
-          </a:p>
-          <a:p>
-            <a:r>
-              <a:rPr lang="en-US" sz="1200" dirty="0">
-                <a:latin typeface="Arial" panose="020B0604020202020204" pitchFamily="34" charset="0"/>
-                <a:cs typeface="Arial" panose="020B0604020202020204" pitchFamily="34" charset="0"/>
-              </a:rPr>
-              <a:t>5626 -&gt; in center of all quadrats</a:t>
-            </a:r>
-          </a:p>
-          <a:p>
-            <a:r>
-              <a:rPr lang="en-US" sz="1200" dirty="0">
-                <a:latin typeface="Arial" panose="020B0604020202020204" pitchFamily="34" charset="0"/>
-                <a:cs typeface="Arial" panose="020B0604020202020204" pitchFamily="34" charset="0"/>
-              </a:rPr>
-              <a:t>3379 -&gt; between quadrats 2 and 4</a:t>
-            </a:r>
-          </a:p>
-          <a:p>
-            <a:r>
-              <a:rPr lang="en-US" sz="1200" dirty="0">
-                <a:latin typeface="Arial" panose="020B0604020202020204" pitchFamily="34" charset="0"/>
-                <a:cs typeface="Arial" panose="020B0604020202020204" pitchFamily="34" charset="0"/>
-              </a:rPr>
-              <a:t>4582 -&gt; between quadrats 1 and 3</a:t>
-            </a:r>
-          </a:p>
-          <a:p>
-            <a:r>
-              <a:rPr lang="en-US" sz="1200" dirty="0">
-                <a:latin typeface="Arial" panose="020B0604020202020204" pitchFamily="34" charset="0"/>
-                <a:cs typeface="Arial" panose="020B0604020202020204" pitchFamily="34" charset="0"/>
-              </a:rPr>
-              <a:t>4511 -&gt; between quadrats 2 and 4</a:t>
-            </a:r>
-          </a:p>
-          <a:p>
-            <a:r>
-              <a:rPr lang="en-US" sz="1200" dirty="0">
-                <a:latin typeface="Arial" panose="020B0604020202020204" pitchFamily="34" charset="0"/>
-                <a:cs typeface="Arial" panose="020B0604020202020204" pitchFamily="34" charset="0"/>
-              </a:rPr>
-              <a:t>5060 in center of all quadrats</a:t>
-            </a:r>
-          </a:p>
-          <a:p>
-            <a:endParaRPr lang="en-US" sz="1200" dirty="0">
+            <a:endParaRPr lang="en-US" sz="1400" dirty="0">
               <a:latin typeface="Arial" panose="020B0604020202020204" pitchFamily="34" charset="0"/>
               <a:cs typeface="Arial" panose="020B0604020202020204" pitchFamily="34" charset="0"/>
             </a:endParaRPr>
           </a:p>
           <a:p>
-            <a:endParaRPr lang="en-US" sz="1200" dirty="0">
+            <a:r>
+              <a:rPr lang="en-US" sz="1400" dirty="0">
+                <a:latin typeface="Arial" panose="020B0604020202020204" pitchFamily="34" charset="0"/>
+                <a:cs typeface="Arial" panose="020B0604020202020204" pitchFamily="34" charset="0"/>
+              </a:rPr>
+              <a:t>4712 -&gt; in center of all quadrats</a:t>
+            </a:r>
+          </a:p>
+          <a:p>
+            <a:endParaRPr lang="en-US" sz="1400" dirty="0">
               <a:latin typeface="Arial" panose="020B0604020202020204" pitchFamily="34" charset="0"/>
               <a:cs typeface="Arial" panose="020B0604020202020204" pitchFamily="34" charset="0"/>
             </a:endParaRPr>
           </a:p>
           <a:p>
             <a:r>
-              <a:rPr lang="en-US" sz="1200" dirty="0">
-                <a:latin typeface="Arial" panose="020B0604020202020204" pitchFamily="34" charset="0"/>
-                <a:cs typeface="Arial" panose="020B0604020202020204" pitchFamily="34" charset="0"/>
-              </a:rPr>
-              <a:t>1184 might also be 5226</a:t>
-            </a:r>
-          </a:p>
-          <a:p>
-            <a:r>
-              <a:rPr lang="en-US" sz="1200" dirty="0">
-                <a:latin typeface="Arial" panose="020B0604020202020204" pitchFamily="34" charset="0"/>
-                <a:cs typeface="Arial" panose="020B0604020202020204" pitchFamily="34" charset="0"/>
-              </a:rPr>
-              <a:t>925 might also be 3925</a:t>
-            </a:r>
-          </a:p>
-          <a:p>
-            <a:endParaRPr lang="en-US" sz="1200" dirty="0">
+              <a:rPr lang="en-US" sz="1400" dirty="0">
+                <a:latin typeface="Arial" panose="020B0604020202020204" pitchFamily="34" charset="0"/>
+                <a:cs typeface="Arial" panose="020B0604020202020204" pitchFamily="34" charset="0"/>
+              </a:rPr>
+              <a:t>5267 -&gt; between quadrats 1 and 3</a:t>
+            </a:r>
+          </a:p>
+          <a:p>
+            <a:endParaRPr lang="en-US" sz="1400" dirty="0">
               <a:latin typeface="Arial" panose="020B0604020202020204" pitchFamily="34" charset="0"/>
               <a:cs typeface="Arial" panose="020B0604020202020204" pitchFamily="34" charset="0"/>
             </a:endParaRPr>
           </a:p>
           <a:p>
             <a:r>
-              <a:rPr lang="en-US" sz="1200" dirty="0">
+              <a:rPr lang="en-US" sz="1400" dirty="0">
+                <a:latin typeface="Arial" panose="020B0604020202020204" pitchFamily="34" charset="0"/>
+                <a:cs typeface="Arial" panose="020B0604020202020204" pitchFamily="34" charset="0"/>
+              </a:rPr>
+              <a:t>5641 -&gt; between quadrats 2 and 4</a:t>
+            </a:r>
+          </a:p>
+          <a:p>
+            <a:endParaRPr lang="en-US" sz="1400" dirty="0">
+              <a:latin typeface="Arial" panose="020B0604020202020204" pitchFamily="34" charset="0"/>
+              <a:cs typeface="Arial" panose="020B0604020202020204" pitchFamily="34" charset="0"/>
+            </a:endParaRPr>
+          </a:p>
+          <a:p>
+            <a:r>
+              <a:rPr lang="en-US" sz="1400" dirty="0">
+                <a:latin typeface="Arial" panose="020B0604020202020204" pitchFamily="34" charset="0"/>
+                <a:cs typeface="Arial" panose="020B0604020202020204" pitchFamily="34" charset="0"/>
+              </a:rPr>
+              <a:t>3305 -&gt; between quadrats 1 and 3</a:t>
+            </a:r>
+          </a:p>
+          <a:p>
+            <a:endParaRPr lang="en-US" sz="1400" dirty="0">
+              <a:latin typeface="Arial" panose="020B0604020202020204" pitchFamily="34" charset="0"/>
+              <a:cs typeface="Arial" panose="020B0604020202020204" pitchFamily="34" charset="0"/>
+            </a:endParaRPr>
+          </a:p>
+          <a:p>
+            <a:r>
+              <a:rPr lang="en-US" sz="1400" dirty="0">
+                <a:latin typeface="Arial" panose="020B0604020202020204" pitchFamily="34" charset="0"/>
+                <a:cs typeface="Arial" panose="020B0604020202020204" pitchFamily="34" charset="0"/>
+              </a:rPr>
+              <a:t>5403 -&gt; in center of all quadrats</a:t>
+            </a:r>
+          </a:p>
+          <a:p>
+            <a:endParaRPr lang="en-US" sz="1400" dirty="0">
+              <a:latin typeface="Arial" panose="020B0604020202020204" pitchFamily="34" charset="0"/>
+              <a:cs typeface="Arial" panose="020B0604020202020204" pitchFamily="34" charset="0"/>
+            </a:endParaRPr>
+          </a:p>
+          <a:p>
+            <a:r>
+              <a:rPr lang="en-US" sz="1400" dirty="0">
+                <a:latin typeface="Arial" panose="020B0604020202020204" pitchFamily="34" charset="0"/>
+                <a:cs typeface="Arial" panose="020B0604020202020204" pitchFamily="34" charset="0"/>
+              </a:rPr>
+              <a:t>5626 -&gt; in center of all quadrats</a:t>
+            </a:r>
+          </a:p>
+          <a:p>
+            <a:endParaRPr lang="en-US" sz="1400" dirty="0">
+              <a:latin typeface="Arial" panose="020B0604020202020204" pitchFamily="34" charset="0"/>
+              <a:cs typeface="Arial" panose="020B0604020202020204" pitchFamily="34" charset="0"/>
+            </a:endParaRPr>
+          </a:p>
+          <a:p>
+            <a:r>
+              <a:rPr lang="en-US" sz="1400" dirty="0">
+                <a:latin typeface="Arial" panose="020B0604020202020204" pitchFamily="34" charset="0"/>
+                <a:cs typeface="Arial" panose="020B0604020202020204" pitchFamily="34" charset="0"/>
+              </a:rPr>
+              <a:t>3379 -&gt; between quadrats 2 and 4</a:t>
+            </a:r>
+          </a:p>
+          <a:p>
+            <a:endParaRPr lang="en-US" sz="1400" dirty="0">
+              <a:latin typeface="Arial" panose="020B0604020202020204" pitchFamily="34" charset="0"/>
+              <a:cs typeface="Arial" panose="020B0604020202020204" pitchFamily="34" charset="0"/>
+            </a:endParaRPr>
+          </a:p>
+          <a:p>
+            <a:r>
+              <a:rPr lang="en-US" sz="1400" dirty="0">
+                <a:latin typeface="Arial" panose="020B0604020202020204" pitchFamily="34" charset="0"/>
+                <a:cs typeface="Arial" panose="020B0604020202020204" pitchFamily="34" charset="0"/>
+              </a:rPr>
+              <a:t>4582 -&gt; between quadrats 1 and 3</a:t>
+            </a:r>
+          </a:p>
+          <a:p>
+            <a:endParaRPr lang="en-US" sz="1400" dirty="0">
+              <a:latin typeface="Arial" panose="020B0604020202020204" pitchFamily="34" charset="0"/>
+              <a:cs typeface="Arial" panose="020B0604020202020204" pitchFamily="34" charset="0"/>
+            </a:endParaRPr>
+          </a:p>
+          <a:p>
+            <a:r>
+              <a:rPr lang="en-US" sz="1400" dirty="0">
+                <a:latin typeface="Arial" panose="020B0604020202020204" pitchFamily="34" charset="0"/>
+                <a:cs typeface="Arial" panose="020B0604020202020204" pitchFamily="34" charset="0"/>
+              </a:rPr>
+              <a:t>4511 -&gt; between quadrats 2 and 4</a:t>
+            </a:r>
+          </a:p>
+          <a:p>
+            <a:endParaRPr lang="en-US" sz="1400" dirty="0">
+              <a:latin typeface="Arial" panose="020B0604020202020204" pitchFamily="34" charset="0"/>
+              <a:cs typeface="Arial" panose="020B0604020202020204" pitchFamily="34" charset="0"/>
+            </a:endParaRPr>
+          </a:p>
+          <a:p>
+            <a:r>
+              <a:rPr lang="en-US" sz="1400" dirty="0">
+                <a:latin typeface="Arial" panose="020B0604020202020204" pitchFamily="34" charset="0"/>
+                <a:cs typeface="Arial" panose="020B0604020202020204" pitchFamily="34" charset="0"/>
+              </a:rPr>
+              <a:t>5060 in center of all quadrats</a:t>
+            </a:r>
+          </a:p>
+          <a:p>
+            <a:endParaRPr lang="en-US" sz="1400" dirty="0">
+              <a:latin typeface="Arial" panose="020B0604020202020204" pitchFamily="34" charset="0"/>
+              <a:cs typeface="Arial" panose="020B0604020202020204" pitchFamily="34" charset="0"/>
+            </a:endParaRPr>
+          </a:p>
+          <a:p>
+            <a:endParaRPr lang="en-US" sz="1400" dirty="0">
+              <a:latin typeface="Arial" panose="020B0604020202020204" pitchFamily="34" charset="0"/>
+              <a:cs typeface="Arial" panose="020B0604020202020204" pitchFamily="34" charset="0"/>
+            </a:endParaRPr>
+          </a:p>
+          <a:p>
+            <a:r>
+              <a:rPr lang="en-US" sz="1400" dirty="0">
+                <a:latin typeface="Arial" panose="020B0604020202020204" pitchFamily="34" charset="0"/>
+                <a:cs typeface="Arial" panose="020B0604020202020204" pitchFamily="34" charset="0"/>
+              </a:rPr>
+              <a:t>1184 might also be 5226</a:t>
+            </a:r>
+          </a:p>
+          <a:p>
+            <a:r>
+              <a:rPr lang="en-US" sz="1400" dirty="0">
+                <a:latin typeface="Arial" panose="020B0604020202020204" pitchFamily="34" charset="0"/>
+                <a:cs typeface="Arial" panose="020B0604020202020204" pitchFamily="34" charset="0"/>
+              </a:rPr>
+              <a:t>925 might also be 3925</a:t>
+            </a:r>
+          </a:p>
+          <a:p>
+            <a:endParaRPr lang="en-US" sz="1400" dirty="0">
+              <a:latin typeface="Arial" panose="020B0604020202020204" pitchFamily="34" charset="0"/>
+              <a:cs typeface="Arial" panose="020B0604020202020204" pitchFamily="34" charset="0"/>
+            </a:endParaRPr>
+          </a:p>
+          <a:p>
+            <a:r>
+              <a:rPr lang="en-US" sz="1400" dirty="0">
                 <a:latin typeface="Arial" panose="020B0604020202020204" pitchFamily="34" charset="0"/>
                 <a:cs typeface="Arial" panose="020B0604020202020204" pitchFamily="34" charset="0"/>
               </a:rPr>
@@ -46077,22 +46292,22 @@
         </p:nvSpPr>
         <p:spPr>
           <a:xfrm>
-            <a:off x="4926402" y="4062020"/>
-            <a:ext cx="415498" cy="584775"/>
-          </a:xfrm>
-          <a:prstGeom prst="rect">
-            <a:avLst/>
-          </a:prstGeom>
-          <a:noFill/>
-        </p:spPr>
-        <p:txBody>
-          <a:bodyPr wrap="none" rtlCol="0">
-            <a:spAutoFit/>
-          </a:bodyPr>
-          <a:lstStyle/>
-          <a:p>
-            <a:r>
-              <a:rPr lang="en-US" sz="800" dirty="0">
+            <a:off x="4926402" y="4078204"/>
+            <a:ext cx="396262" cy="553998"/>
+          </a:xfrm>
+          <a:prstGeom prst="rect">
+            <a:avLst/>
+          </a:prstGeom>
+          <a:noFill/>
+        </p:spPr>
+        <p:txBody>
+          <a:bodyPr wrap="none" rtlCol="0">
+            <a:spAutoFit/>
+          </a:bodyPr>
+          <a:lstStyle/>
+          <a:p>
+            <a:r>
+              <a:rPr lang="en-US" sz="750" dirty="0">
                 <a:latin typeface="Arial" panose="020B0604020202020204" pitchFamily="34" charset="0"/>
                 <a:cs typeface="Arial" panose="020B0604020202020204" pitchFamily="34" charset="0"/>
               </a:rPr>
@@ -46101,7 +46316,7 @@
           </a:p>
           <a:p>
             <a:r>
-              <a:rPr lang="en-US" sz="800" dirty="0">
+              <a:rPr lang="en-US" sz="750" dirty="0">
                 <a:latin typeface="Arial" panose="020B0604020202020204" pitchFamily="34" charset="0"/>
                 <a:cs typeface="Arial" panose="020B0604020202020204" pitchFamily="34" charset="0"/>
               </a:rPr>
@@ -46110,7 +46325,7 @@
           </a:p>
           <a:p>
             <a:r>
-              <a:rPr lang="en-US" sz="800" dirty="0">
+              <a:rPr lang="en-US" sz="750" dirty="0">
                 <a:latin typeface="Arial" panose="020B0604020202020204" pitchFamily="34" charset="0"/>
                 <a:cs typeface="Arial" panose="020B0604020202020204" pitchFamily="34" charset="0"/>
               </a:rPr>
@@ -46119,7 +46334,7 @@
           </a:p>
           <a:p>
             <a:r>
-              <a:rPr lang="en-US" sz="800" dirty="0">
+              <a:rPr lang="en-US" sz="750" dirty="0">
                 <a:latin typeface="Arial" panose="020B0604020202020204" pitchFamily="34" charset="0"/>
                 <a:cs typeface="Arial" panose="020B0604020202020204" pitchFamily="34" charset="0"/>
               </a:rPr>
@@ -46995,21 +47210,21 @@
         <p:spPr>
           <a:xfrm>
             <a:off x="8351870" y="1557761"/>
-            <a:ext cx="2525050" cy="1938992"/>
-          </a:xfrm>
-          <a:prstGeom prst="rect">
-            <a:avLst/>
-          </a:prstGeom>
-          <a:noFill/>
-        </p:spPr>
-        <p:txBody>
-          <a:bodyPr wrap="none" rtlCol="0">
-            <a:spAutoFit/>
-          </a:bodyPr>
-          <a:lstStyle/>
-          <a:p>
-            <a:r>
-              <a:rPr lang="en-US" sz="1200" dirty="0">
+            <a:ext cx="2912977" cy="4185761"/>
+          </a:xfrm>
+          <a:prstGeom prst="rect">
+            <a:avLst/>
+          </a:prstGeom>
+          <a:noFill/>
+        </p:spPr>
+        <p:txBody>
+          <a:bodyPr wrap="none" rtlCol="0">
+            <a:spAutoFit/>
+          </a:bodyPr>
+          <a:lstStyle/>
+          <a:p>
+            <a:r>
+              <a:rPr lang="en-US" sz="1400" dirty="0">
                 <a:latin typeface="Arial" panose="020B0604020202020204" pitchFamily="34" charset="0"/>
                 <a:cs typeface="Arial" panose="020B0604020202020204" pitchFamily="34" charset="0"/>
               </a:rPr>
@@ -47017,8 +47232,14 @@
             </a:r>
           </a:p>
           <a:p>
-            <a:r>
-              <a:rPr lang="en-US" sz="1200" dirty="0">
+            <a:endParaRPr lang="en-US" sz="1400" dirty="0">
+              <a:latin typeface="Arial" panose="020B0604020202020204" pitchFamily="34" charset="0"/>
+              <a:cs typeface="Arial" panose="020B0604020202020204" pitchFamily="34" charset="0"/>
+            </a:endParaRPr>
+          </a:p>
+          <a:p>
+            <a:r>
+              <a:rPr lang="en-US" sz="1400" dirty="0">
                 <a:latin typeface="Arial" panose="020B0604020202020204" pitchFamily="34" charset="0"/>
                 <a:cs typeface="Arial" panose="020B0604020202020204" pitchFamily="34" charset="0"/>
               </a:rPr>
@@ -47026,8 +47247,14 @@
             </a:r>
           </a:p>
           <a:p>
-            <a:r>
-              <a:rPr lang="en-US" sz="1200" dirty="0">
+            <a:endParaRPr lang="en-US" sz="1400" dirty="0">
+              <a:latin typeface="Arial" panose="020B0604020202020204" pitchFamily="34" charset="0"/>
+              <a:cs typeface="Arial" panose="020B0604020202020204" pitchFamily="34" charset="0"/>
+            </a:endParaRPr>
+          </a:p>
+          <a:p>
+            <a:r>
+              <a:rPr lang="en-US" sz="1400" dirty="0">
                 <a:latin typeface="Arial" panose="020B0604020202020204" pitchFamily="34" charset="0"/>
                 <a:cs typeface="Arial" panose="020B0604020202020204" pitchFamily="34" charset="0"/>
               </a:rPr>
@@ -47035,8 +47262,14 @@
             </a:r>
           </a:p>
           <a:p>
-            <a:r>
-              <a:rPr lang="en-US" sz="1200" dirty="0">
+            <a:endParaRPr lang="en-US" sz="1400" dirty="0">
+              <a:latin typeface="Arial" panose="020B0604020202020204" pitchFamily="34" charset="0"/>
+              <a:cs typeface="Arial" panose="020B0604020202020204" pitchFamily="34" charset="0"/>
+            </a:endParaRPr>
+          </a:p>
+          <a:p>
+            <a:r>
+              <a:rPr lang="en-US" sz="1400" dirty="0">
                 <a:latin typeface="Arial" panose="020B0604020202020204" pitchFamily="34" charset="0"/>
                 <a:cs typeface="Arial" panose="020B0604020202020204" pitchFamily="34" charset="0"/>
               </a:rPr>
@@ -47044,8 +47277,14 @@
             </a:r>
           </a:p>
           <a:p>
-            <a:r>
-              <a:rPr lang="en-US" sz="1200" dirty="0">
+            <a:endParaRPr lang="en-US" sz="1400" dirty="0">
+              <a:latin typeface="Arial" panose="020B0604020202020204" pitchFamily="34" charset="0"/>
+              <a:cs typeface="Arial" panose="020B0604020202020204" pitchFamily="34" charset="0"/>
+            </a:endParaRPr>
+          </a:p>
+          <a:p>
+            <a:r>
+              <a:rPr lang="en-US" sz="1400" dirty="0">
                 <a:latin typeface="Arial" panose="020B0604020202020204" pitchFamily="34" charset="0"/>
                 <a:cs typeface="Arial" panose="020B0604020202020204" pitchFamily="34" charset="0"/>
               </a:rPr>
@@ -47053,8 +47292,14 @@
             </a:r>
           </a:p>
           <a:p>
-            <a:r>
-              <a:rPr lang="en-US" sz="1200" dirty="0">
+            <a:endParaRPr lang="en-US" sz="1400" dirty="0">
+              <a:latin typeface="Arial" panose="020B0604020202020204" pitchFamily="34" charset="0"/>
+              <a:cs typeface="Arial" panose="020B0604020202020204" pitchFamily="34" charset="0"/>
+            </a:endParaRPr>
+          </a:p>
+          <a:p>
+            <a:r>
+              <a:rPr lang="en-US" sz="1400" dirty="0">
                 <a:latin typeface="Arial" panose="020B0604020202020204" pitchFamily="34" charset="0"/>
                 <a:cs typeface="Arial" panose="020B0604020202020204" pitchFamily="34" charset="0"/>
               </a:rPr>
@@ -47062,8 +47307,14 @@
             </a:r>
           </a:p>
           <a:p>
-            <a:r>
-              <a:rPr lang="en-US" sz="1200" dirty="0">
+            <a:endParaRPr lang="en-US" sz="1400" dirty="0">
+              <a:latin typeface="Arial" panose="020B0604020202020204" pitchFamily="34" charset="0"/>
+              <a:cs typeface="Arial" panose="020B0604020202020204" pitchFamily="34" charset="0"/>
+            </a:endParaRPr>
+          </a:p>
+          <a:p>
+            <a:r>
+              <a:rPr lang="en-US" sz="1400" dirty="0">
                 <a:latin typeface="Arial" panose="020B0604020202020204" pitchFamily="34" charset="0"/>
                 <a:cs typeface="Arial" panose="020B0604020202020204" pitchFamily="34" charset="0"/>
               </a:rPr>
@@ -47071,8 +47322,14 @@
             </a:r>
           </a:p>
           <a:p>
-            <a:r>
-              <a:rPr lang="en-US" sz="1200" dirty="0">
+            <a:endParaRPr lang="en-US" sz="1400" dirty="0">
+              <a:latin typeface="Arial" panose="020B0604020202020204" pitchFamily="34" charset="0"/>
+              <a:cs typeface="Arial" panose="020B0604020202020204" pitchFamily="34" charset="0"/>
+            </a:endParaRPr>
+          </a:p>
+          <a:p>
+            <a:r>
+              <a:rPr lang="en-US" sz="1400" dirty="0">
                 <a:latin typeface="Arial" panose="020B0604020202020204" pitchFamily="34" charset="0"/>
                 <a:cs typeface="Arial" panose="020B0604020202020204" pitchFamily="34" charset="0"/>
               </a:rPr>
@@ -47080,8 +47337,14 @@
             </a:r>
           </a:p>
           <a:p>
-            <a:r>
-              <a:rPr lang="en-US" sz="1200" dirty="0">
+            <a:endParaRPr lang="en-US" sz="1400" dirty="0">
+              <a:latin typeface="Arial" panose="020B0604020202020204" pitchFamily="34" charset="0"/>
+              <a:cs typeface="Arial" panose="020B0604020202020204" pitchFamily="34" charset="0"/>
+            </a:endParaRPr>
+          </a:p>
+          <a:p>
+            <a:r>
+              <a:rPr lang="en-US" sz="1400" dirty="0">
                 <a:latin typeface="Arial" panose="020B0604020202020204" pitchFamily="34" charset="0"/>
                 <a:cs typeface="Arial" panose="020B0604020202020204" pitchFamily="34" charset="0"/>
               </a:rPr>
@@ -47089,8 +47352,14 @@
             </a:r>
           </a:p>
           <a:p>
-            <a:r>
-              <a:rPr lang="en-US" sz="1200" dirty="0">
+            <a:endParaRPr lang="en-US" sz="1400" dirty="0">
+              <a:latin typeface="Arial" panose="020B0604020202020204" pitchFamily="34" charset="0"/>
+              <a:cs typeface="Arial" panose="020B0604020202020204" pitchFamily="34" charset="0"/>
+            </a:endParaRPr>
+          </a:p>
+          <a:p>
+            <a:r>
+              <a:rPr lang="en-US" sz="1400" dirty="0">
                 <a:latin typeface="Arial" panose="020B0604020202020204" pitchFamily="34" charset="0"/>
                 <a:cs typeface="Arial" panose="020B0604020202020204" pitchFamily="34" charset="0"/>
               </a:rPr>
@@ -47153,7 +47422,7 @@
         <p:spPr>
           <a:xfrm>
             <a:off x="11143153" y="7403068"/>
-            <a:ext cx="946285" cy="369332"/>
+            <a:ext cx="919034" cy="369332"/>
           </a:xfrm>
           <a:prstGeom prst="rect">
             <a:avLst/>
@@ -47176,11 +47445,270 @@
             </a:r>
             <a:r>
               <a:rPr lang="en-US" dirty="0"/>
-              <a:t>=36</a:t>
-            </a:r>
-          </a:p>
-        </p:txBody>
-      </p:sp>
+              <a:t>=44</a:t>
+            </a:r>
+          </a:p>
+        </p:txBody>
+      </p:sp>
+      <p:sp>
+        <p:nvSpPr>
+          <p:cNvPr id="5" name="TextBox 4">
+            <a:extLst>
+              <a:ext uri="{FF2B5EF4-FFF2-40B4-BE49-F238E27FC236}">
+                <a16:creationId xmlns:a16="http://schemas.microsoft.com/office/drawing/2014/main" id="{920B7F84-FDF6-E82A-5ACA-FDB111C75536}"/>
+              </a:ext>
+            </a:extLst>
+          </p:cNvPr>
+          <p:cNvSpPr txBox="1"/>
+          <p:nvPr/>
+        </p:nvSpPr>
+        <p:spPr>
+          <a:xfrm>
+            <a:off x="2516528" y="1034725"/>
+            <a:ext cx="540533" cy="200055"/>
+          </a:xfrm>
+          <a:prstGeom prst="rect">
+            <a:avLst/>
+          </a:prstGeom>
+          <a:noFill/>
+        </p:spPr>
+        <p:txBody>
+          <a:bodyPr wrap="none" rtlCol="0">
+            <a:spAutoFit/>
+          </a:bodyPr>
+          <a:lstStyle/>
+          <a:p>
+            <a:r>
+              <a:rPr lang="en-US" sz="700" dirty="0"/>
+              <a:t>TT24_132</a:t>
+            </a:r>
+          </a:p>
+        </p:txBody>
+      </p:sp>
+      <p:sp>
+        <p:nvSpPr>
+          <p:cNvPr id="11" name="TextBox 10">
+            <a:extLst>
+              <a:ext uri="{FF2B5EF4-FFF2-40B4-BE49-F238E27FC236}">
+                <a16:creationId xmlns:a16="http://schemas.microsoft.com/office/drawing/2014/main" id="{02926CE1-AFF5-23A9-8229-E905FCCD4321}"/>
+              </a:ext>
+            </a:extLst>
+          </p:cNvPr>
+          <p:cNvSpPr txBox="1"/>
+          <p:nvPr/>
+        </p:nvSpPr>
+        <p:spPr>
+          <a:xfrm>
+            <a:off x="3470239" y="2028743"/>
+            <a:ext cx="540533" cy="353943"/>
+          </a:xfrm>
+          <a:prstGeom prst="rect">
+            <a:avLst/>
+          </a:prstGeom>
+          <a:noFill/>
+        </p:spPr>
+        <p:txBody>
+          <a:bodyPr wrap="none" rtlCol="0">
+            <a:spAutoFit/>
+          </a:bodyPr>
+          <a:lstStyle/>
+          <a:p>
+            <a:pPr algn="ctr"/>
+            <a:r>
+              <a:rPr lang="en-US" sz="1000" dirty="0"/>
+              <a:t>3468</a:t>
+            </a:r>
+          </a:p>
+          <a:p>
+            <a:pPr algn="ctr"/>
+            <a:r>
+              <a:rPr lang="en-US" sz="700" dirty="0"/>
+              <a:t>TT24_131</a:t>
+            </a:r>
+          </a:p>
+        </p:txBody>
+      </p:sp>
+      <p:sp>
+        <p:nvSpPr>
+          <p:cNvPr id="12" name="TextBox 11">
+            <a:extLst>
+              <a:ext uri="{FF2B5EF4-FFF2-40B4-BE49-F238E27FC236}">
+                <a16:creationId xmlns:a16="http://schemas.microsoft.com/office/drawing/2014/main" id="{F3EAC100-197B-6B36-9CFD-1CD58B000797}"/>
+              </a:ext>
+            </a:extLst>
+          </p:cNvPr>
+          <p:cNvSpPr txBox="1"/>
+          <p:nvPr/>
+        </p:nvSpPr>
+        <p:spPr>
+          <a:xfrm>
+            <a:off x="2182738" y="1897827"/>
+            <a:ext cx="441146" cy="507831"/>
+          </a:xfrm>
+          <a:prstGeom prst="rect">
+            <a:avLst/>
+          </a:prstGeom>
+          <a:noFill/>
+        </p:spPr>
+        <p:txBody>
+          <a:bodyPr wrap="none" rtlCol="0">
+            <a:spAutoFit/>
+          </a:bodyPr>
+          <a:lstStyle/>
+          <a:p>
+            <a:r>
+              <a:rPr lang="en-US" sz="900" dirty="0">
+                <a:latin typeface="Arial" panose="020B0604020202020204" pitchFamily="34" charset="0"/>
+                <a:cs typeface="Arial" panose="020B0604020202020204" pitchFamily="34" charset="0"/>
+              </a:rPr>
+              <a:t>1146</a:t>
+            </a:r>
+          </a:p>
+          <a:p>
+            <a:r>
+              <a:rPr lang="en-US" sz="900" dirty="0">
+                <a:latin typeface="Arial" panose="020B0604020202020204" pitchFamily="34" charset="0"/>
+                <a:cs typeface="Arial" panose="020B0604020202020204" pitchFamily="34" charset="0"/>
+              </a:rPr>
+              <a:t>1495</a:t>
+            </a:r>
+          </a:p>
+          <a:p>
+            <a:r>
+              <a:rPr lang="en-US" sz="900" dirty="0">
+                <a:latin typeface="Arial" panose="020B0604020202020204" pitchFamily="34" charset="0"/>
+                <a:cs typeface="Arial" panose="020B0604020202020204" pitchFamily="34" charset="0"/>
+              </a:rPr>
+              <a:t>3120</a:t>
+            </a:r>
+          </a:p>
+        </p:txBody>
+      </p:sp>
+      <p:sp>
+        <p:nvSpPr>
+          <p:cNvPr id="128" name="TextBox 127">
+            <a:extLst>
+              <a:ext uri="{FF2B5EF4-FFF2-40B4-BE49-F238E27FC236}">
+                <a16:creationId xmlns:a16="http://schemas.microsoft.com/office/drawing/2014/main" id="{B4DB5161-C24C-A25D-7ABC-272ED23DDACF}"/>
+              </a:ext>
+            </a:extLst>
+          </p:cNvPr>
+          <p:cNvSpPr txBox="1"/>
+          <p:nvPr/>
+        </p:nvSpPr>
+        <p:spPr>
+          <a:xfrm>
+            <a:off x="2125321" y="2485354"/>
+            <a:ext cx="441146" cy="230832"/>
+          </a:xfrm>
+          <a:prstGeom prst="rect">
+            <a:avLst/>
+          </a:prstGeom>
+          <a:noFill/>
+        </p:spPr>
+        <p:txBody>
+          <a:bodyPr wrap="none" rtlCol="0">
+            <a:spAutoFit/>
+          </a:bodyPr>
+          <a:lstStyle/>
+          <a:p>
+            <a:r>
+              <a:rPr lang="en-US" sz="900" dirty="0">
+                <a:latin typeface="Arial" panose="020B0604020202020204" pitchFamily="34" charset="0"/>
+                <a:cs typeface="Arial" panose="020B0604020202020204" pitchFamily="34" charset="0"/>
+              </a:rPr>
+              <a:t>1406</a:t>
+            </a:r>
+          </a:p>
+        </p:txBody>
+      </p:sp>
+      <p:sp>
+        <p:nvSpPr>
+          <p:cNvPr id="129" name="TextBox 128">
+            <a:extLst>
+              <a:ext uri="{FF2B5EF4-FFF2-40B4-BE49-F238E27FC236}">
+                <a16:creationId xmlns:a16="http://schemas.microsoft.com/office/drawing/2014/main" id="{E8B5235C-1CE3-AB28-4BA5-D9A708C02F14}"/>
+              </a:ext>
+            </a:extLst>
+          </p:cNvPr>
+          <p:cNvSpPr txBox="1"/>
+          <p:nvPr/>
+        </p:nvSpPr>
+        <p:spPr>
+          <a:xfrm>
+            <a:off x="2634366" y="2935265"/>
+            <a:ext cx="540533" cy="200055"/>
+          </a:xfrm>
+          <a:prstGeom prst="rect">
+            <a:avLst/>
+          </a:prstGeom>
+          <a:noFill/>
+          <a:ln w="12700">
+            <a:solidFill>
+              <a:schemeClr val="tx1"/>
+            </a:solidFill>
+          </a:ln>
+        </p:spPr>
+        <p:txBody>
+          <a:bodyPr wrap="none" rtlCol="0">
+            <a:spAutoFit/>
+          </a:bodyPr>
+          <a:lstStyle/>
+          <a:p>
+            <a:r>
+              <a:rPr lang="en-US" sz="700" dirty="0"/>
+              <a:t>TT24_130</a:t>
+            </a:r>
+          </a:p>
+        </p:txBody>
+      </p:sp>
+      <p:cxnSp>
+        <p:nvCxnSpPr>
+          <p:cNvPr id="133" name="Curved Connector 132">
+            <a:extLst>
+              <a:ext uri="{FF2B5EF4-FFF2-40B4-BE49-F238E27FC236}">
+                <a16:creationId xmlns:a16="http://schemas.microsoft.com/office/drawing/2014/main" id="{2965ED24-7EB0-2CC3-01DC-0236A5B9F334}"/>
+              </a:ext>
+            </a:extLst>
+          </p:cNvPr>
+          <p:cNvCxnSpPr>
+            <a:stCxn id="129" idx="3"/>
+            <a:endCxn id="145" idx="3"/>
+          </p:cNvCxnSpPr>
+          <p:nvPr/>
+        </p:nvCxnSpPr>
+        <p:spPr>
+          <a:xfrm flipH="1" flipV="1">
+            <a:off x="3012791" y="2590131"/>
+            <a:ext cx="162108" cy="445162"/>
+          </a:xfrm>
+          <a:prstGeom prst="curvedConnector3">
+            <a:avLst>
+              <a:gd name="adj1" fmla="val -141017"/>
+            </a:avLst>
+          </a:prstGeom>
+          <a:ln w="12700">
+            <a:solidFill>
+              <a:schemeClr val="tx1"/>
+            </a:solidFill>
+            <a:tailEnd type="triangle"/>
+          </a:ln>
+        </p:spPr>
+        <p:style>
+          <a:lnRef idx="1">
+            <a:schemeClr val="accent1"/>
+          </a:lnRef>
+          <a:fillRef idx="0">
+            <a:schemeClr val="accent1"/>
+          </a:fillRef>
+          <a:effectRef idx="0">
+            <a:schemeClr val="accent1"/>
+          </a:effectRef>
+          <a:fontRef idx="minor">
+            <a:schemeClr val="tx1"/>
+          </a:fontRef>
+        </p:style>
+      </p:cxnSp>
     </p:spTree>
     <p:extLst>
       <p:ext uri="{BB962C8B-B14F-4D97-AF65-F5344CB8AC3E}">

</xml_diff>

<commit_message>
update plot map with new IDs
</commit_message>
<xml_diff>
--- a/maps/TT_subplot_map_fillable.pptx
+++ b/maps/TT_subplot_map_fillable.pptx
@@ -260,7 +260,7 @@
           <a:p>
             <a:fld id="{3EBFF84C-30FA-534C-A298-DE425FBFB86B}" type="datetimeFigureOut">
               <a:rPr lang="en-US" smtClean="0"/>
-              <a:t>5/17/24</a:t>
+              <a:t>5/27/24</a:t>
             </a:fld>
             <a:endParaRPr lang="en-US"/>
           </a:p>
@@ -430,7 +430,7 @@
           <a:p>
             <a:fld id="{3EBFF84C-30FA-534C-A298-DE425FBFB86B}" type="datetimeFigureOut">
               <a:rPr lang="en-US" smtClean="0"/>
-              <a:t>5/17/24</a:t>
+              <a:t>5/27/24</a:t>
             </a:fld>
             <a:endParaRPr lang="en-US"/>
           </a:p>
@@ -610,7 +610,7 @@
           <a:p>
             <a:fld id="{3EBFF84C-30FA-534C-A298-DE425FBFB86B}" type="datetimeFigureOut">
               <a:rPr lang="en-US" smtClean="0"/>
-              <a:t>5/17/24</a:t>
+              <a:t>5/27/24</a:t>
             </a:fld>
             <a:endParaRPr lang="en-US"/>
           </a:p>
@@ -780,7 +780,7 @@
           <a:p>
             <a:fld id="{3EBFF84C-30FA-534C-A298-DE425FBFB86B}" type="datetimeFigureOut">
               <a:rPr lang="en-US" smtClean="0"/>
-              <a:t>5/17/24</a:t>
+              <a:t>5/27/24</a:t>
             </a:fld>
             <a:endParaRPr lang="en-US"/>
           </a:p>
@@ -1024,7 +1024,7 @@
           <a:p>
             <a:fld id="{3EBFF84C-30FA-534C-A298-DE425FBFB86B}" type="datetimeFigureOut">
               <a:rPr lang="en-US" smtClean="0"/>
-              <a:t>5/17/24</a:t>
+              <a:t>5/27/24</a:t>
             </a:fld>
             <a:endParaRPr lang="en-US"/>
           </a:p>
@@ -1256,7 +1256,7 @@
           <a:p>
             <a:fld id="{3EBFF84C-30FA-534C-A298-DE425FBFB86B}" type="datetimeFigureOut">
               <a:rPr lang="en-US" smtClean="0"/>
-              <a:t>5/17/24</a:t>
+              <a:t>5/27/24</a:t>
             </a:fld>
             <a:endParaRPr lang="en-US"/>
           </a:p>
@@ -1623,7 +1623,7 @@
           <a:p>
             <a:fld id="{3EBFF84C-30FA-534C-A298-DE425FBFB86B}" type="datetimeFigureOut">
               <a:rPr lang="en-US" smtClean="0"/>
-              <a:t>5/17/24</a:t>
+              <a:t>5/27/24</a:t>
             </a:fld>
             <a:endParaRPr lang="en-US"/>
           </a:p>
@@ -1741,7 +1741,7 @@
           <a:p>
             <a:fld id="{3EBFF84C-30FA-534C-A298-DE425FBFB86B}" type="datetimeFigureOut">
               <a:rPr lang="en-US" smtClean="0"/>
-              <a:t>5/17/24</a:t>
+              <a:t>5/27/24</a:t>
             </a:fld>
             <a:endParaRPr lang="en-US"/>
           </a:p>
@@ -1836,7 +1836,7 @@
           <a:p>
             <a:fld id="{3EBFF84C-30FA-534C-A298-DE425FBFB86B}" type="datetimeFigureOut">
               <a:rPr lang="en-US" smtClean="0"/>
-              <a:t>5/17/24</a:t>
+              <a:t>5/27/24</a:t>
             </a:fld>
             <a:endParaRPr lang="en-US"/>
           </a:p>
@@ -2113,7 +2113,7 @@
           <a:p>
             <a:fld id="{3EBFF84C-30FA-534C-A298-DE425FBFB86B}" type="datetimeFigureOut">
               <a:rPr lang="en-US" smtClean="0"/>
-              <a:t>5/17/24</a:t>
+              <a:t>5/27/24</a:t>
             </a:fld>
             <a:endParaRPr lang="en-US"/>
           </a:p>
@@ -2370,7 +2370,7 @@
           <a:p>
             <a:fld id="{3EBFF84C-30FA-534C-A298-DE425FBFB86B}" type="datetimeFigureOut">
               <a:rPr lang="en-US" smtClean="0"/>
-              <a:t>5/17/24</a:t>
+              <a:t>5/27/24</a:t>
             </a:fld>
             <a:endParaRPr lang="en-US"/>
           </a:p>
@@ -2583,7 +2583,7 @@
           <a:p>
             <a:fld id="{3EBFF84C-30FA-534C-A298-DE425FBFB86B}" type="datetimeFigureOut">
               <a:rPr lang="en-US" smtClean="0"/>
-              <a:t>5/17/24</a:t>
+              <a:t>5/27/24</a:t>
             </a:fld>
             <a:endParaRPr lang="en-US"/>
           </a:p>
@@ -20644,7 +20644,7 @@
           <a:p>
             <a:pPr algn="ctr"/>
             <a:r>
-              <a:rPr lang="en-US" sz="900" dirty="0">
+              <a:rPr lang="en-US" sz="900" strike="sngStrike" dirty="0">
                 <a:latin typeface="Arial" panose="020B0604020202020204" pitchFamily="34" charset="0"/>
                 <a:cs typeface="Arial" panose="020B0604020202020204" pitchFamily="34" charset="0"/>
               </a:rPr>
@@ -20683,7 +20683,7 @@
           <a:p>
             <a:pPr algn="ctr"/>
             <a:r>
-              <a:rPr lang="en-US" sz="1000" dirty="0">
+              <a:rPr lang="en-US" sz="1000" strike="sngStrike" dirty="0">
                 <a:latin typeface="Arial" panose="020B0604020202020204" pitchFamily="34" charset="0"/>
                 <a:cs typeface="Arial" panose="020B0604020202020204" pitchFamily="34" charset="0"/>
               </a:rPr>
@@ -39600,31 +39600,31 @@
         </p:nvSpPr>
         <p:spPr>
           <a:xfrm>
-            <a:off x="2169364" y="1003575"/>
-            <a:ext cx="441146" cy="507831"/>
-          </a:xfrm>
-          <a:prstGeom prst="rect">
-            <a:avLst/>
-          </a:prstGeom>
-          <a:noFill/>
-        </p:spPr>
-        <p:txBody>
-          <a:bodyPr wrap="none" rtlCol="0">
-            <a:spAutoFit/>
-          </a:bodyPr>
-          <a:lstStyle/>
-          <a:p>
-            <a:r>
-              <a:rPr lang="en-US" sz="900" dirty="0">
-                <a:latin typeface="Arial" panose="020B0604020202020204" pitchFamily="34" charset="0"/>
-                <a:cs typeface="Arial" panose="020B0604020202020204" pitchFamily="34" charset="0"/>
-              </a:rPr>
-              <a:t>4760</a:t>
-            </a:r>
-          </a:p>
-          <a:p>
-            <a:r>
-              <a:rPr lang="en-US" sz="900" dirty="0">
+            <a:off x="2201732" y="995483"/>
+            <a:ext cx="383438" cy="523220"/>
+          </a:xfrm>
+          <a:prstGeom prst="rect">
+            <a:avLst/>
+          </a:prstGeom>
+          <a:noFill/>
+        </p:spPr>
+        <p:txBody>
+          <a:bodyPr wrap="none" rtlCol="0">
+            <a:spAutoFit/>
+          </a:bodyPr>
+          <a:lstStyle/>
+          <a:p>
+            <a:r>
+              <a:rPr lang="en-US" sz="700" dirty="0">
+                <a:latin typeface="Arial" panose="020B0604020202020204" pitchFamily="34" charset="0"/>
+                <a:cs typeface="Arial" panose="020B0604020202020204" pitchFamily="34" charset="0"/>
+              </a:rPr>
+              <a:t>4766</a:t>
+            </a:r>
+          </a:p>
+          <a:p>
+            <a:r>
+              <a:rPr lang="en-US" sz="700" dirty="0">
                 <a:latin typeface="Arial" panose="020B0604020202020204" pitchFamily="34" charset="0"/>
                 <a:cs typeface="Arial" panose="020B0604020202020204" pitchFamily="34" charset="0"/>
               </a:rPr>
@@ -39633,11 +39633,20 @@
           </a:p>
           <a:p>
             <a:r>
-              <a:rPr lang="en-US" sz="900" dirty="0">
+              <a:rPr lang="en-US" sz="700" dirty="0">
                 <a:latin typeface="Arial" panose="020B0604020202020204" pitchFamily="34" charset="0"/>
                 <a:cs typeface="Arial" panose="020B0604020202020204" pitchFamily="34" charset="0"/>
               </a:rPr>
               <a:t>5267</a:t>
+            </a:r>
+          </a:p>
+          <a:p>
+            <a:r>
+              <a:rPr lang="en-US" sz="700" dirty="0">
+                <a:latin typeface="Arial" panose="020B0604020202020204" pitchFamily="34" charset="0"/>
+                <a:cs typeface="Arial" panose="020B0604020202020204" pitchFamily="34" charset="0"/>
+              </a:rPr>
+              <a:t>4373</a:t>
             </a:r>
           </a:p>
         </p:txBody>
@@ -40739,8 +40748,8 @@
         </p:nvSpPr>
         <p:spPr>
           <a:xfrm>
-            <a:off x="6202074" y="1489350"/>
-            <a:ext cx="580608" cy="400110"/>
+            <a:off x="6258981" y="1489350"/>
+            <a:ext cx="466794" cy="400110"/>
           </a:xfrm>
           <a:prstGeom prst="rect">
             <a:avLst/>
@@ -40759,22 +40768,18 @@
                 <a:latin typeface="Arial" panose="020B0604020202020204" pitchFamily="34" charset="0"/>
                 <a:cs typeface="Arial" panose="020B0604020202020204" pitchFamily="34" charset="0"/>
               </a:rPr>
+              <a:t>5771</a:t>
+            </a:r>
+          </a:p>
+          <a:p>
+            <a:pPr algn="ctr"/>
+            <a:r>
+              <a:rPr lang="en-US" sz="1000" dirty="0">
+                <a:latin typeface="Arial" panose="020B0604020202020204" pitchFamily="34" charset="0"/>
+                <a:cs typeface="Arial" panose="020B0604020202020204" pitchFamily="34" charset="0"/>
+              </a:rPr>
               <a:t>5365</a:t>
             </a:r>
-          </a:p>
-          <a:p>
-            <a:pPr algn="ctr"/>
-            <a:r>
-              <a:rPr lang="en-US" sz="1000" dirty="0" err="1">
-                <a:latin typeface="Arial" panose="020B0604020202020204" pitchFamily="34" charset="0"/>
-                <a:cs typeface="Arial" panose="020B0604020202020204" pitchFamily="34" charset="0"/>
-              </a:rPr>
-              <a:t>Pkadot</a:t>
-            </a:r>
-            <a:endParaRPr lang="en-US" sz="1000" dirty="0">
-              <a:latin typeface="Arial" panose="020B0604020202020204" pitchFamily="34" charset="0"/>
-              <a:cs typeface="Arial" panose="020B0604020202020204" pitchFamily="34" charset="0"/>
-            </a:endParaRPr>
           </a:p>
         </p:txBody>
       </p:sp>
@@ -46992,26 +46997,37 @@
         </p:nvSpPr>
         <p:spPr>
           <a:xfrm>
-            <a:off x="1198063" y="4666265"/>
-            <a:ext cx="466794" cy="246221"/>
-          </a:xfrm>
-          <a:prstGeom prst="rect">
-            <a:avLst/>
-          </a:prstGeom>
-          <a:noFill/>
-        </p:spPr>
-        <p:txBody>
-          <a:bodyPr wrap="none" rtlCol="0">
-            <a:spAutoFit/>
-          </a:bodyPr>
-          <a:lstStyle/>
-          <a:p>
-            <a:r>
-              <a:rPr lang="en-US" sz="1000" strike="sngStrike" dirty="0">
+            <a:off x="1124723" y="4625985"/>
+            <a:ext cx="591829" cy="338554"/>
+          </a:xfrm>
+          <a:prstGeom prst="rect">
+            <a:avLst/>
+          </a:prstGeom>
+          <a:noFill/>
+        </p:spPr>
+        <p:txBody>
+          <a:bodyPr wrap="none" rtlCol="0">
+            <a:spAutoFit/>
+          </a:bodyPr>
+          <a:lstStyle/>
+          <a:p>
+            <a:pPr algn="ctr"/>
+            <a:r>
+              <a:rPr lang="en-US" sz="900" strike="sngStrike" dirty="0">
                 <a:latin typeface="Arial" panose="020B0604020202020204" pitchFamily="34" charset="0"/>
                 <a:cs typeface="Arial" panose="020B0604020202020204" pitchFamily="34" charset="0"/>
               </a:rPr>
               <a:t>6893</a:t>
+            </a:r>
+          </a:p>
+          <a:p>
+            <a:pPr algn="ctr"/>
+            <a:r>
+              <a:rPr lang="en-US" sz="700" dirty="0">
+                <a:latin typeface="Arial" panose="020B0604020202020204" pitchFamily="34" charset="0"/>
+                <a:cs typeface="Arial" panose="020B0604020202020204" pitchFamily="34" charset="0"/>
+              </a:rPr>
+              <a:t>TT24_150</a:t>
             </a:r>
           </a:p>
         </p:txBody>
@@ -47106,7 +47122,7 @@
         </p:nvSpPr>
         <p:spPr>
           <a:xfrm>
-            <a:off x="7202270" y="6278798"/>
+            <a:off x="7186086" y="6278798"/>
             <a:ext cx="441146" cy="507831"/>
           </a:xfrm>
           <a:prstGeom prst="rect">
@@ -47162,22 +47178,23 @@
         </p:nvSpPr>
         <p:spPr>
           <a:xfrm>
-            <a:off x="7194178" y="6800440"/>
-            <a:ext cx="466794" cy="400110"/>
-          </a:xfrm>
-          <a:prstGeom prst="rect">
-            <a:avLst/>
-          </a:prstGeom>
-          <a:noFill/>
-        </p:spPr>
-        <p:txBody>
-          <a:bodyPr wrap="none" rtlCol="0">
-            <a:spAutoFit/>
-          </a:bodyPr>
-          <a:lstStyle/>
-          <a:p>
-            <a:r>
-              <a:rPr lang="en-US" sz="1000" dirty="0">
+            <a:off x="7105166" y="6735704"/>
+            <a:ext cx="591829" cy="477054"/>
+          </a:xfrm>
+          <a:prstGeom prst="rect">
+            <a:avLst/>
+          </a:prstGeom>
+          <a:noFill/>
+        </p:spPr>
+        <p:txBody>
+          <a:bodyPr wrap="none" rtlCol="0">
+            <a:spAutoFit/>
+          </a:bodyPr>
+          <a:lstStyle/>
+          <a:p>
+            <a:pPr algn="ctr"/>
+            <a:r>
+              <a:rPr lang="en-US" sz="900" dirty="0">
                 <a:latin typeface="Arial" panose="020B0604020202020204" pitchFamily="34" charset="0"/>
                 <a:cs typeface="Arial" panose="020B0604020202020204" pitchFamily="34" charset="0"/>
               </a:rPr>
@@ -47185,12 +47202,23 @@
             </a:r>
           </a:p>
           <a:p>
-            <a:r>
-              <a:rPr lang="en-US" sz="1000" dirty="0">
+            <a:pPr algn="ctr"/>
+            <a:r>
+              <a:rPr lang="en-US" sz="900" dirty="0">
                 <a:latin typeface="Arial" panose="020B0604020202020204" pitchFamily="34" charset="0"/>
                 <a:cs typeface="Arial" panose="020B0604020202020204" pitchFamily="34" charset="0"/>
               </a:rPr>
               <a:t>6462</a:t>
+            </a:r>
+          </a:p>
+          <a:p>
+            <a:pPr algn="ctr"/>
+            <a:r>
+              <a:rPr lang="en-US" sz="700" dirty="0">
+                <a:latin typeface="Arial" panose="020B0604020202020204" pitchFamily="34" charset="0"/>
+                <a:cs typeface="Arial" panose="020B0604020202020204" pitchFamily="34" charset="0"/>
+              </a:rPr>
+              <a:t>TT24_233</a:t>
             </a:r>
           </a:p>
         </p:txBody>
@@ -47464,7 +47492,7 @@
         </p:nvSpPr>
         <p:spPr>
           <a:xfrm>
-            <a:off x="2516528" y="1034725"/>
+            <a:off x="2516528" y="1148013"/>
             <a:ext cx="540533" cy="200055"/>
           </a:xfrm>
           <a:prstGeom prst="rect">
@@ -47499,7 +47527,7 @@
         </p:nvSpPr>
         <p:spPr>
           <a:xfrm>
-            <a:off x="3470239" y="2028743"/>
+            <a:off x="3502607" y="2028743"/>
             <a:ext cx="540533" cy="353943"/>
           </a:xfrm>
           <a:prstGeom prst="rect">
@@ -47515,7 +47543,7 @@
           <a:p>
             <a:pPr algn="ctr"/>
             <a:r>
-              <a:rPr lang="en-US" sz="1000" dirty="0"/>
+              <a:rPr lang="en-US" sz="1000" strike="sngStrike" dirty="0"/>
               <a:t>3468</a:t>
             </a:r>
           </a:p>
@@ -47709,6 +47737,287 @@
           </a:fontRef>
         </p:style>
       </p:cxnSp>
+      <p:sp>
+        <p:nvSpPr>
+          <p:cNvPr id="131" name="TextBox 130">
+            <a:extLst>
+              <a:ext uri="{FF2B5EF4-FFF2-40B4-BE49-F238E27FC236}">
+                <a16:creationId xmlns:a16="http://schemas.microsoft.com/office/drawing/2014/main" id="{BEDE69B2-73F8-D9C5-DCDA-4FD6C6F807EE}"/>
+              </a:ext>
+            </a:extLst>
+          </p:cNvPr>
+          <p:cNvSpPr txBox="1"/>
+          <p:nvPr/>
+        </p:nvSpPr>
+        <p:spPr>
+          <a:xfrm>
+            <a:off x="3467111" y="5979718"/>
+            <a:ext cx="591829" cy="200055"/>
+          </a:xfrm>
+          <a:prstGeom prst="rect">
+            <a:avLst/>
+          </a:prstGeom>
+          <a:noFill/>
+        </p:spPr>
+        <p:txBody>
+          <a:bodyPr wrap="none" rtlCol="0">
+            <a:spAutoFit/>
+          </a:bodyPr>
+          <a:lstStyle/>
+          <a:p>
+            <a:r>
+              <a:rPr lang="en-US" sz="700" dirty="0">
+                <a:latin typeface="Arial" panose="020B0604020202020204" pitchFamily="34" charset="0"/>
+                <a:cs typeface="Arial" panose="020B0604020202020204" pitchFamily="34" charset="0"/>
+              </a:rPr>
+              <a:t>TT24_105</a:t>
+            </a:r>
+          </a:p>
+        </p:txBody>
+      </p:sp>
+      <p:sp>
+        <p:nvSpPr>
+          <p:cNvPr id="134" name="TextBox 133">
+            <a:extLst>
+              <a:ext uri="{FF2B5EF4-FFF2-40B4-BE49-F238E27FC236}">
+                <a16:creationId xmlns:a16="http://schemas.microsoft.com/office/drawing/2014/main" id="{BB729A0F-EB44-CC84-5710-428620F274C3}"/>
+              </a:ext>
+            </a:extLst>
+          </p:cNvPr>
+          <p:cNvSpPr txBox="1"/>
+          <p:nvPr/>
+        </p:nvSpPr>
+        <p:spPr>
+          <a:xfrm>
+            <a:off x="3917697" y="5975810"/>
+            <a:ext cx="591829" cy="200055"/>
+          </a:xfrm>
+          <a:prstGeom prst="rect">
+            <a:avLst/>
+          </a:prstGeom>
+          <a:noFill/>
+        </p:spPr>
+        <p:txBody>
+          <a:bodyPr wrap="none" rtlCol="0">
+            <a:spAutoFit/>
+          </a:bodyPr>
+          <a:lstStyle/>
+          <a:p>
+            <a:r>
+              <a:rPr lang="en-US" sz="700" dirty="0">
+                <a:latin typeface="Arial" panose="020B0604020202020204" pitchFamily="34" charset="0"/>
+                <a:cs typeface="Arial" panose="020B0604020202020204" pitchFamily="34" charset="0"/>
+              </a:rPr>
+              <a:t>TT24_106</a:t>
+            </a:r>
+          </a:p>
+        </p:txBody>
+      </p:sp>
+      <p:sp>
+        <p:nvSpPr>
+          <p:cNvPr id="151" name="TextBox 150">
+            <a:extLst>
+              <a:ext uri="{FF2B5EF4-FFF2-40B4-BE49-F238E27FC236}">
+                <a16:creationId xmlns:a16="http://schemas.microsoft.com/office/drawing/2014/main" id="{1E2A08BA-998D-A91D-D659-C2BFE4FD2750}"/>
+              </a:ext>
+            </a:extLst>
+          </p:cNvPr>
+          <p:cNvSpPr txBox="1"/>
+          <p:nvPr/>
+        </p:nvSpPr>
+        <p:spPr>
+          <a:xfrm>
+            <a:off x="7113716" y="1134930"/>
+            <a:ext cx="591829" cy="200055"/>
+          </a:xfrm>
+          <a:prstGeom prst="rect">
+            <a:avLst/>
+          </a:prstGeom>
+          <a:noFill/>
+        </p:spPr>
+        <p:txBody>
+          <a:bodyPr wrap="none" rtlCol="0">
+            <a:spAutoFit/>
+          </a:bodyPr>
+          <a:lstStyle/>
+          <a:p>
+            <a:r>
+              <a:rPr lang="en-US" sz="700" dirty="0">
+                <a:latin typeface="Arial" panose="020B0604020202020204" pitchFamily="34" charset="0"/>
+                <a:cs typeface="Arial" panose="020B0604020202020204" pitchFamily="34" charset="0"/>
+              </a:rPr>
+              <a:t>TT24_231</a:t>
+            </a:r>
+          </a:p>
+        </p:txBody>
+      </p:sp>
+      <p:sp>
+        <p:nvSpPr>
+          <p:cNvPr id="164" name="TextBox 163">
+            <a:extLst>
+              <a:ext uri="{FF2B5EF4-FFF2-40B4-BE49-F238E27FC236}">
+                <a16:creationId xmlns:a16="http://schemas.microsoft.com/office/drawing/2014/main" id="{7EEB5067-2A07-C4FB-1CAF-9518C5174320}"/>
+              </a:ext>
+            </a:extLst>
+          </p:cNvPr>
+          <p:cNvSpPr txBox="1"/>
+          <p:nvPr/>
+        </p:nvSpPr>
+        <p:spPr>
+          <a:xfrm>
+            <a:off x="7120160" y="2068408"/>
+            <a:ext cx="591829" cy="200055"/>
+          </a:xfrm>
+          <a:prstGeom prst="rect">
+            <a:avLst/>
+          </a:prstGeom>
+          <a:noFill/>
+        </p:spPr>
+        <p:txBody>
+          <a:bodyPr wrap="none" rtlCol="0">
+            <a:spAutoFit/>
+          </a:bodyPr>
+          <a:lstStyle/>
+          <a:p>
+            <a:r>
+              <a:rPr lang="en-US" sz="700" dirty="0">
+                <a:latin typeface="Arial" panose="020B0604020202020204" pitchFamily="34" charset="0"/>
+                <a:cs typeface="Arial" panose="020B0604020202020204" pitchFamily="34" charset="0"/>
+              </a:rPr>
+              <a:t>TT24_232</a:t>
+            </a:r>
+          </a:p>
+        </p:txBody>
+      </p:sp>
+      <p:sp>
+        <p:nvSpPr>
+          <p:cNvPr id="165" name="TextBox 164">
+            <a:extLst>
+              <a:ext uri="{FF2B5EF4-FFF2-40B4-BE49-F238E27FC236}">
+                <a16:creationId xmlns:a16="http://schemas.microsoft.com/office/drawing/2014/main" id="{2426852E-008C-7105-E4D7-4844740BFE94}"/>
+              </a:ext>
+            </a:extLst>
+          </p:cNvPr>
+          <p:cNvSpPr txBox="1"/>
+          <p:nvPr/>
+        </p:nvSpPr>
+        <p:spPr>
+          <a:xfrm>
+            <a:off x="5742819" y="2070757"/>
+            <a:ext cx="591829" cy="200055"/>
+          </a:xfrm>
+          <a:prstGeom prst="rect">
+            <a:avLst/>
+          </a:prstGeom>
+          <a:noFill/>
+        </p:spPr>
+        <p:txBody>
+          <a:bodyPr wrap="none" rtlCol="0">
+            <a:spAutoFit/>
+          </a:bodyPr>
+          <a:lstStyle/>
+          <a:p>
+            <a:r>
+              <a:rPr lang="en-US" sz="700" dirty="0">
+                <a:latin typeface="Arial" panose="020B0604020202020204" pitchFamily="34" charset="0"/>
+                <a:cs typeface="Arial" panose="020B0604020202020204" pitchFamily="34" charset="0"/>
+              </a:rPr>
+              <a:t>TT24_234</a:t>
+            </a:r>
+          </a:p>
+        </p:txBody>
+      </p:sp>
+      <p:sp>
+        <p:nvSpPr>
+          <p:cNvPr id="166" name="TextBox 165">
+            <a:extLst>
+              <a:ext uri="{FF2B5EF4-FFF2-40B4-BE49-F238E27FC236}">
+                <a16:creationId xmlns:a16="http://schemas.microsoft.com/office/drawing/2014/main" id="{7C49CFBD-29D8-475E-D6B4-21BEEA4D745A}"/>
+              </a:ext>
+            </a:extLst>
+          </p:cNvPr>
+          <p:cNvSpPr txBox="1"/>
+          <p:nvPr/>
+        </p:nvSpPr>
+        <p:spPr>
+          <a:xfrm>
+            <a:off x="1607287" y="4699193"/>
+            <a:ext cx="540533" cy="200055"/>
+          </a:xfrm>
+          <a:prstGeom prst="rect">
+            <a:avLst/>
+          </a:prstGeom>
+          <a:noFill/>
+        </p:spPr>
+        <p:txBody>
+          <a:bodyPr wrap="none" rtlCol="0">
+            <a:spAutoFit/>
+          </a:bodyPr>
+          <a:lstStyle/>
+          <a:p>
+            <a:r>
+              <a:rPr lang="en-US" sz="700" dirty="0"/>
+              <a:t>TT24_135</a:t>
+            </a:r>
+          </a:p>
+        </p:txBody>
+      </p:sp>
+      <p:sp>
+        <p:nvSpPr>
+          <p:cNvPr id="167" name="TextBox 166">
+            <a:extLst>
+              <a:ext uri="{FF2B5EF4-FFF2-40B4-BE49-F238E27FC236}">
+                <a16:creationId xmlns:a16="http://schemas.microsoft.com/office/drawing/2014/main" id="{AA18B0C6-FB89-903A-0477-711CAA7F9F93}"/>
+              </a:ext>
+            </a:extLst>
+          </p:cNvPr>
+          <p:cNvSpPr txBox="1"/>
+          <p:nvPr/>
+        </p:nvSpPr>
+        <p:spPr>
+          <a:xfrm>
+            <a:off x="3540544" y="4533866"/>
+            <a:ext cx="441146" cy="507831"/>
+          </a:xfrm>
+          <a:prstGeom prst="rect">
+            <a:avLst/>
+          </a:prstGeom>
+          <a:noFill/>
+        </p:spPr>
+        <p:txBody>
+          <a:bodyPr wrap="none" rtlCol="0">
+            <a:spAutoFit/>
+          </a:bodyPr>
+          <a:lstStyle/>
+          <a:p>
+            <a:r>
+              <a:rPr lang="en-US" sz="900" dirty="0">
+                <a:latin typeface="Arial" panose="020B0604020202020204" pitchFamily="34" charset="0"/>
+                <a:cs typeface="Arial" panose="020B0604020202020204" pitchFamily="34" charset="0"/>
+              </a:rPr>
+              <a:t>2369</a:t>
+            </a:r>
+          </a:p>
+          <a:p>
+            <a:r>
+              <a:rPr lang="en-US" sz="900" dirty="0">
+                <a:latin typeface="Arial" panose="020B0604020202020204" pitchFamily="34" charset="0"/>
+                <a:cs typeface="Arial" panose="020B0604020202020204" pitchFamily="34" charset="0"/>
+              </a:rPr>
+              <a:t>2392</a:t>
+            </a:r>
+          </a:p>
+          <a:p>
+            <a:r>
+              <a:rPr lang="en-US" sz="900" dirty="0">
+                <a:latin typeface="Arial" panose="020B0604020202020204" pitchFamily="34" charset="0"/>
+                <a:cs typeface="Arial" panose="020B0604020202020204" pitchFamily="34" charset="0"/>
+              </a:rPr>
+              <a:t>5506</a:t>
+            </a:r>
+          </a:p>
+        </p:txBody>
+      </p:sp>
     </p:spTree>
     <p:extLst>
       <p:ext uri="{BB962C8B-B14F-4D97-AF65-F5344CB8AC3E}">

</xml_diff>

<commit_message>
push final raw curve files, update curve log, and finalize subplot map
</commit_message>
<xml_diff>
--- a/maps/TT_subplot_map_fillable.pptx
+++ b/maps/TT_subplot_map_fillable.pptx
@@ -260,7 +260,7 @@
           <a:p>
             <a:fld id="{3EBFF84C-30FA-534C-A298-DE425FBFB86B}" type="datetimeFigureOut">
               <a:rPr lang="en-US" smtClean="0"/>
-              <a:t>5/27/24</a:t>
+              <a:t>9/16/24</a:t>
             </a:fld>
             <a:endParaRPr lang="en-US"/>
           </a:p>
@@ -430,7 +430,7 @@
           <a:p>
             <a:fld id="{3EBFF84C-30FA-534C-A298-DE425FBFB86B}" type="datetimeFigureOut">
               <a:rPr lang="en-US" smtClean="0"/>
-              <a:t>5/27/24</a:t>
+              <a:t>9/16/24</a:t>
             </a:fld>
             <a:endParaRPr lang="en-US"/>
           </a:p>
@@ -610,7 +610,7 @@
           <a:p>
             <a:fld id="{3EBFF84C-30FA-534C-A298-DE425FBFB86B}" type="datetimeFigureOut">
               <a:rPr lang="en-US" smtClean="0"/>
-              <a:t>5/27/24</a:t>
+              <a:t>9/16/24</a:t>
             </a:fld>
             <a:endParaRPr lang="en-US"/>
           </a:p>
@@ -780,7 +780,7 @@
           <a:p>
             <a:fld id="{3EBFF84C-30FA-534C-A298-DE425FBFB86B}" type="datetimeFigureOut">
               <a:rPr lang="en-US" smtClean="0"/>
-              <a:t>5/27/24</a:t>
+              <a:t>9/16/24</a:t>
             </a:fld>
             <a:endParaRPr lang="en-US"/>
           </a:p>
@@ -1024,7 +1024,7 @@
           <a:p>
             <a:fld id="{3EBFF84C-30FA-534C-A298-DE425FBFB86B}" type="datetimeFigureOut">
               <a:rPr lang="en-US" smtClean="0"/>
-              <a:t>5/27/24</a:t>
+              <a:t>9/16/24</a:t>
             </a:fld>
             <a:endParaRPr lang="en-US"/>
           </a:p>
@@ -1256,7 +1256,7 @@
           <a:p>
             <a:fld id="{3EBFF84C-30FA-534C-A298-DE425FBFB86B}" type="datetimeFigureOut">
               <a:rPr lang="en-US" smtClean="0"/>
-              <a:t>5/27/24</a:t>
+              <a:t>9/16/24</a:t>
             </a:fld>
             <a:endParaRPr lang="en-US"/>
           </a:p>
@@ -1623,7 +1623,7 @@
           <a:p>
             <a:fld id="{3EBFF84C-30FA-534C-A298-DE425FBFB86B}" type="datetimeFigureOut">
               <a:rPr lang="en-US" smtClean="0"/>
-              <a:t>5/27/24</a:t>
+              <a:t>9/16/24</a:t>
             </a:fld>
             <a:endParaRPr lang="en-US"/>
           </a:p>
@@ -1741,7 +1741,7 @@
           <a:p>
             <a:fld id="{3EBFF84C-30FA-534C-A298-DE425FBFB86B}" type="datetimeFigureOut">
               <a:rPr lang="en-US" smtClean="0"/>
-              <a:t>5/27/24</a:t>
+              <a:t>9/16/24</a:t>
             </a:fld>
             <a:endParaRPr lang="en-US"/>
           </a:p>
@@ -1836,7 +1836,7 @@
           <a:p>
             <a:fld id="{3EBFF84C-30FA-534C-A298-DE425FBFB86B}" type="datetimeFigureOut">
               <a:rPr lang="en-US" smtClean="0"/>
-              <a:t>5/27/24</a:t>
+              <a:t>9/16/24</a:t>
             </a:fld>
             <a:endParaRPr lang="en-US"/>
           </a:p>
@@ -2113,7 +2113,7 @@
           <a:p>
             <a:fld id="{3EBFF84C-30FA-534C-A298-DE425FBFB86B}" type="datetimeFigureOut">
               <a:rPr lang="en-US" smtClean="0"/>
-              <a:t>5/27/24</a:t>
+              <a:t>9/16/24</a:t>
             </a:fld>
             <a:endParaRPr lang="en-US"/>
           </a:p>
@@ -2370,7 +2370,7 @@
           <a:p>
             <a:fld id="{3EBFF84C-30FA-534C-A298-DE425FBFB86B}" type="datetimeFigureOut">
               <a:rPr lang="en-US" smtClean="0"/>
-              <a:t>5/27/24</a:t>
+              <a:t>9/16/24</a:t>
             </a:fld>
             <a:endParaRPr lang="en-US"/>
           </a:p>
@@ -2583,7 +2583,7 @@
           <a:p>
             <a:fld id="{3EBFF84C-30FA-534C-A298-DE425FBFB86B}" type="datetimeFigureOut">
               <a:rPr lang="en-US" smtClean="0"/>
-              <a:t>5/27/24</a:t>
+              <a:t>9/16/24</a:t>
             </a:fld>
             <a:endParaRPr lang="en-US"/>
           </a:p>
@@ -21002,8 +21002,43 @@
         </p:nvSpPr>
         <p:spPr>
           <a:xfrm>
-            <a:off x="3921325" y="6873275"/>
-            <a:ext cx="591829" cy="215444"/>
+            <a:off x="4002889" y="6889921"/>
+            <a:ext cx="389850" cy="215444"/>
+          </a:xfrm>
+          <a:prstGeom prst="rect">
+            <a:avLst/>
+          </a:prstGeom>
+          <a:noFill/>
+        </p:spPr>
+        <p:txBody>
+          <a:bodyPr wrap="none" rtlCol="0">
+            <a:spAutoFit/>
+          </a:bodyPr>
+          <a:lstStyle/>
+          <a:p>
+            <a:r>
+              <a:rPr lang="en-US" sz="800" dirty="0"/>
+              <a:t>1251</a:t>
+            </a:r>
+          </a:p>
+        </p:txBody>
+      </p:sp>
+      <p:sp>
+        <p:nvSpPr>
+          <p:cNvPr id="151" name="TextBox 150">
+            <a:extLst>
+              <a:ext uri="{FF2B5EF4-FFF2-40B4-BE49-F238E27FC236}">
+                <a16:creationId xmlns:a16="http://schemas.microsoft.com/office/drawing/2014/main" id="{ABAE58ED-A720-0DAB-F917-0FE298AEDB67}"/>
+              </a:ext>
+            </a:extLst>
+          </p:cNvPr>
+          <p:cNvSpPr txBox="1"/>
+          <p:nvPr/>
+        </p:nvSpPr>
+        <p:spPr>
+          <a:xfrm>
+            <a:off x="2486048" y="6817902"/>
+            <a:ext cx="591829" cy="338554"/>
           </a:xfrm>
           <a:prstGeom prst="rect">
             <a:avLst/>
@@ -21021,45 +21056,10 @@
               <a:t>TT24_101</a:t>
             </a:r>
           </a:p>
-        </p:txBody>
-      </p:sp>
-      <p:sp>
-        <p:nvSpPr>
-          <p:cNvPr id="151" name="TextBox 150">
-            <a:extLst>
-              <a:ext uri="{FF2B5EF4-FFF2-40B4-BE49-F238E27FC236}">
-                <a16:creationId xmlns:a16="http://schemas.microsoft.com/office/drawing/2014/main" id="{ABAE58ED-A720-0DAB-F917-0FE298AEDB67}"/>
-              </a:ext>
-            </a:extLst>
-          </p:cNvPr>
-          <p:cNvSpPr txBox="1"/>
-          <p:nvPr/>
-        </p:nvSpPr>
-        <p:spPr>
-          <a:xfrm>
-            <a:off x="2486048" y="6817902"/>
-            <a:ext cx="591829" cy="338554"/>
-          </a:xfrm>
-          <a:prstGeom prst="rect">
-            <a:avLst/>
-          </a:prstGeom>
-          <a:noFill/>
-        </p:spPr>
-        <p:txBody>
-          <a:bodyPr wrap="none" rtlCol="0">
-            <a:spAutoFit/>
-          </a:bodyPr>
-          <a:lstStyle/>
           <a:p>
             <a:r>
               <a:rPr lang="en-US" sz="800" dirty="0"/>
               <a:t>TT24_102</a:t>
-            </a:r>
-          </a:p>
-          <a:p>
-            <a:r>
-              <a:rPr lang="en-US" sz="800" dirty="0"/>
-              <a:t>TT24_103</a:t>
             </a:r>
           </a:p>
         </p:txBody>
@@ -21225,6 +21225,84 @@
                 <a:cs typeface="Arial" panose="020B0604020202020204" pitchFamily="34" charset="0"/>
               </a:rPr>
               <a:t>TT24_210</a:t>
+            </a:r>
+          </a:p>
+        </p:txBody>
+      </p:sp>
+      <p:sp>
+        <p:nvSpPr>
+          <p:cNvPr id="155" name="TextBox 154">
+            <a:extLst>
+              <a:ext uri="{FF2B5EF4-FFF2-40B4-BE49-F238E27FC236}">
+                <a16:creationId xmlns:a16="http://schemas.microsoft.com/office/drawing/2014/main" id="{5C976E3A-7875-8C83-8EB8-941924D1D65C}"/>
+              </a:ext>
+            </a:extLst>
+          </p:cNvPr>
+          <p:cNvSpPr txBox="1"/>
+          <p:nvPr/>
+        </p:nvSpPr>
+        <p:spPr>
+          <a:xfrm>
+            <a:off x="7217770" y="2460314"/>
+            <a:ext cx="396263" cy="246221"/>
+          </a:xfrm>
+          <a:prstGeom prst="rect">
+            <a:avLst/>
+          </a:prstGeom>
+          <a:noFill/>
+        </p:spPr>
+        <p:txBody>
+          <a:bodyPr wrap="none" rtlCol="0">
+            <a:spAutoFit/>
+          </a:bodyPr>
+          <a:lstStyle/>
+          <a:p>
+            <a:pPr algn="ctr"/>
+            <a:r>
+              <a:rPr lang="en-US" sz="1000" dirty="0">
+                <a:latin typeface="Arial" panose="020B0604020202020204" pitchFamily="34" charset="0"/>
+                <a:cs typeface="Arial" panose="020B0604020202020204" pitchFamily="34" charset="0"/>
+              </a:rPr>
+              <a:t>129</a:t>
+            </a:r>
+          </a:p>
+        </p:txBody>
+      </p:sp>
+      <p:sp>
+        <p:nvSpPr>
+          <p:cNvPr id="157" name="TextBox 156">
+            <a:extLst>
+              <a:ext uri="{FF2B5EF4-FFF2-40B4-BE49-F238E27FC236}">
+                <a16:creationId xmlns:a16="http://schemas.microsoft.com/office/drawing/2014/main" id="{188B668A-8F26-139F-127E-8F4E82BF5A13}"/>
+              </a:ext>
+            </a:extLst>
+          </p:cNvPr>
+          <p:cNvSpPr txBox="1"/>
+          <p:nvPr/>
+        </p:nvSpPr>
+        <p:spPr>
+          <a:xfrm>
+            <a:off x="6654138" y="3348739"/>
+            <a:ext cx="591829" cy="200055"/>
+          </a:xfrm>
+          <a:prstGeom prst="rect">
+            <a:avLst/>
+          </a:prstGeom>
+          <a:noFill/>
+        </p:spPr>
+        <p:txBody>
+          <a:bodyPr wrap="none" rtlCol="0">
+            <a:spAutoFit/>
+          </a:bodyPr>
+          <a:lstStyle/>
+          <a:p>
+            <a:pPr algn="ctr"/>
+            <a:r>
+              <a:rPr lang="en-US" sz="700" dirty="0">
+                <a:latin typeface="Arial" panose="020B0604020202020204" pitchFamily="34" charset="0"/>
+                <a:cs typeface="Arial" panose="020B0604020202020204" pitchFamily="34" charset="0"/>
+              </a:rPr>
+              <a:t>TT24_211</a:t>
             </a:r>
           </a:p>
         </p:txBody>
@@ -28147,6 +28225,45 @@
           </a:p>
         </p:txBody>
       </p:sp>
+      <p:sp>
+        <p:nvSpPr>
+          <p:cNvPr id="11" name="TextBox 10">
+            <a:extLst>
+              <a:ext uri="{FF2B5EF4-FFF2-40B4-BE49-F238E27FC236}">
+                <a16:creationId xmlns:a16="http://schemas.microsoft.com/office/drawing/2014/main" id="{A45E2DE1-5A2F-638A-EF35-D2872443EFA3}"/>
+              </a:ext>
+            </a:extLst>
+          </p:cNvPr>
+          <p:cNvSpPr txBox="1"/>
+          <p:nvPr/>
+        </p:nvSpPr>
+        <p:spPr>
+          <a:xfrm>
+            <a:off x="2540426" y="1948338"/>
+            <a:ext cx="466795" cy="246221"/>
+          </a:xfrm>
+          <a:prstGeom prst="rect">
+            <a:avLst/>
+          </a:prstGeom>
+          <a:noFill/>
+        </p:spPr>
+        <p:txBody>
+          <a:bodyPr wrap="none" rtlCol="0">
+            <a:spAutoFit/>
+          </a:bodyPr>
+          <a:lstStyle/>
+          <a:p>
+            <a:pPr algn="ctr"/>
+            <a:r>
+              <a:rPr lang="en-US" sz="1000" dirty="0">
+                <a:latin typeface="Arial" panose="020B0604020202020204" pitchFamily="34" charset="0"/>
+                <a:cs typeface="Arial" panose="020B0604020202020204" pitchFamily="34" charset="0"/>
+              </a:rPr>
+              <a:t>6887</a:t>
+            </a:r>
+          </a:p>
+        </p:txBody>
+      </p:sp>
     </p:spTree>
     <p:extLst>
       <p:ext uri="{BB962C8B-B14F-4D97-AF65-F5344CB8AC3E}">
@@ -33536,44 +33653,6 @@
       </p:sp>
       <p:sp>
         <p:nvSpPr>
-          <p:cNvPr id="12" name="TextBox 11">
-            <a:extLst>
-              <a:ext uri="{FF2B5EF4-FFF2-40B4-BE49-F238E27FC236}">
-                <a16:creationId xmlns:a16="http://schemas.microsoft.com/office/drawing/2014/main" id="{AA21BCA6-1601-7196-B433-5A1363F6420F}"/>
-              </a:ext>
-            </a:extLst>
-          </p:cNvPr>
-          <p:cNvSpPr txBox="1"/>
-          <p:nvPr/>
-        </p:nvSpPr>
-        <p:spPr>
-          <a:xfrm>
-            <a:off x="2564492" y="1578250"/>
-            <a:ext cx="466794" cy="246221"/>
-          </a:xfrm>
-          <a:prstGeom prst="rect">
-            <a:avLst/>
-          </a:prstGeom>
-          <a:noFill/>
-        </p:spPr>
-        <p:txBody>
-          <a:bodyPr wrap="none" rtlCol="0">
-            <a:spAutoFit/>
-          </a:bodyPr>
-          <a:lstStyle/>
-          <a:p>
-            <a:r>
-              <a:rPr lang="en-US" sz="1000" dirty="0">
-                <a:latin typeface="Arial" panose="020B0604020202020204" pitchFamily="34" charset="0"/>
-                <a:cs typeface="Arial" panose="020B0604020202020204" pitchFamily="34" charset="0"/>
-              </a:rPr>
-              <a:t>6900</a:t>
-            </a:r>
-          </a:p>
-        </p:txBody>
-      </p:sp>
-      <p:sp>
-        <p:nvSpPr>
           <p:cNvPr id="128" name="TextBox 127">
             <a:extLst>
               <a:ext uri="{FF2B5EF4-FFF2-40B4-BE49-F238E27FC236}">
@@ -40729,7 +40808,7 @@
                 <a:latin typeface="Arial" panose="020B0604020202020204" pitchFamily="34" charset="0"/>
                 <a:cs typeface="Arial" panose="020B0604020202020204" pitchFamily="34" charset="0"/>
               </a:rPr>
-              <a:t>5365 is a polka dot flag</a:t>
+              <a:t>striped1 = 5771; striped2 = 5365</a:t>
             </a:r>
           </a:p>
         </p:txBody>
@@ -47941,7 +48020,7 @@
         </p:nvSpPr>
         <p:spPr>
           <a:xfrm>
-            <a:off x="1607287" y="4699193"/>
+            <a:off x="2058719" y="4244799"/>
             <a:ext cx="540533" cy="200055"/>
           </a:xfrm>
           <a:prstGeom prst="rect">
@@ -48014,6 +48093,79 @@
                 <a:cs typeface="Arial" panose="020B0604020202020204" pitchFamily="34" charset="0"/>
               </a:rPr>
               <a:t>5506</a:t>
+            </a:r>
+          </a:p>
+        </p:txBody>
+      </p:sp>
+      <p:sp>
+        <p:nvSpPr>
+          <p:cNvPr id="168" name="TextBox 167">
+            <a:extLst>
+              <a:ext uri="{FF2B5EF4-FFF2-40B4-BE49-F238E27FC236}">
+                <a16:creationId xmlns:a16="http://schemas.microsoft.com/office/drawing/2014/main" id="{F09F1840-54EB-4A74-E6A7-6BF06831CC8D}"/>
+              </a:ext>
+            </a:extLst>
+          </p:cNvPr>
+          <p:cNvSpPr txBox="1"/>
+          <p:nvPr/>
+        </p:nvSpPr>
+        <p:spPr>
+          <a:xfrm>
+            <a:off x="2501454" y="6874203"/>
+            <a:ext cx="540533" cy="200055"/>
+          </a:xfrm>
+          <a:prstGeom prst="rect">
+            <a:avLst/>
+          </a:prstGeom>
+          <a:noFill/>
+        </p:spPr>
+        <p:txBody>
+          <a:bodyPr wrap="none" rtlCol="0">
+            <a:spAutoFit/>
+          </a:bodyPr>
+          <a:lstStyle/>
+          <a:p>
+            <a:r>
+              <a:rPr lang="en-US" sz="700" dirty="0"/>
+              <a:t>TT24_160</a:t>
+            </a:r>
+          </a:p>
+        </p:txBody>
+      </p:sp>
+      <p:sp>
+        <p:nvSpPr>
+          <p:cNvPr id="169" name="TextBox 168">
+            <a:extLst>
+              <a:ext uri="{FF2B5EF4-FFF2-40B4-BE49-F238E27FC236}">
+                <a16:creationId xmlns:a16="http://schemas.microsoft.com/office/drawing/2014/main" id="{85CDA136-1A28-39A7-2A8E-2AF77F5DE248}"/>
+              </a:ext>
+            </a:extLst>
+          </p:cNvPr>
+          <p:cNvSpPr txBox="1"/>
+          <p:nvPr/>
+        </p:nvSpPr>
+        <p:spPr>
+          <a:xfrm>
+            <a:off x="3558344" y="5597179"/>
+            <a:ext cx="383438" cy="200055"/>
+          </a:xfrm>
+          <a:prstGeom prst="rect">
+            <a:avLst/>
+          </a:prstGeom>
+          <a:noFill/>
+        </p:spPr>
+        <p:txBody>
+          <a:bodyPr wrap="none" rtlCol="0">
+            <a:spAutoFit/>
+          </a:bodyPr>
+          <a:lstStyle/>
+          <a:p>
+            <a:r>
+              <a:rPr lang="en-US" sz="700" dirty="0">
+                <a:latin typeface="Arial" panose="020B0604020202020204" pitchFamily="34" charset="0"/>
+                <a:cs typeface="Arial" panose="020B0604020202020204" pitchFamily="34" charset="0"/>
+              </a:rPr>
+              <a:t>5024</a:t>
             </a:r>
           </a:p>
         </p:txBody>

</xml_diff>

<commit_message>
correct inaccurate plot 6 Mai locations, add a few additional curve fit placeholders
</commit_message>
<xml_diff>
--- a/maps/TT_subplot_map_fillable.pptx
+++ b/maps/TT_subplot_map_fillable.pptx
@@ -260,7 +260,7 @@
           <a:p>
             <a:fld id="{3EBFF84C-30FA-534C-A298-DE425FBFB86B}" type="datetimeFigureOut">
               <a:rPr lang="en-US" smtClean="0"/>
-              <a:t>9/16/24</a:t>
+              <a:t>10/31/24</a:t>
             </a:fld>
             <a:endParaRPr lang="en-US"/>
           </a:p>
@@ -430,7 +430,7 @@
           <a:p>
             <a:fld id="{3EBFF84C-30FA-534C-A298-DE425FBFB86B}" type="datetimeFigureOut">
               <a:rPr lang="en-US" smtClean="0"/>
-              <a:t>9/16/24</a:t>
+              <a:t>10/31/24</a:t>
             </a:fld>
             <a:endParaRPr lang="en-US"/>
           </a:p>
@@ -610,7 +610,7 @@
           <a:p>
             <a:fld id="{3EBFF84C-30FA-534C-A298-DE425FBFB86B}" type="datetimeFigureOut">
               <a:rPr lang="en-US" smtClean="0"/>
-              <a:t>9/16/24</a:t>
+              <a:t>10/31/24</a:t>
             </a:fld>
             <a:endParaRPr lang="en-US"/>
           </a:p>
@@ -780,7 +780,7 @@
           <a:p>
             <a:fld id="{3EBFF84C-30FA-534C-A298-DE425FBFB86B}" type="datetimeFigureOut">
               <a:rPr lang="en-US" smtClean="0"/>
-              <a:t>9/16/24</a:t>
+              <a:t>10/31/24</a:t>
             </a:fld>
             <a:endParaRPr lang="en-US"/>
           </a:p>
@@ -1024,7 +1024,7 @@
           <a:p>
             <a:fld id="{3EBFF84C-30FA-534C-A298-DE425FBFB86B}" type="datetimeFigureOut">
               <a:rPr lang="en-US" smtClean="0"/>
-              <a:t>9/16/24</a:t>
+              <a:t>10/31/24</a:t>
             </a:fld>
             <a:endParaRPr lang="en-US"/>
           </a:p>
@@ -1256,7 +1256,7 @@
           <a:p>
             <a:fld id="{3EBFF84C-30FA-534C-A298-DE425FBFB86B}" type="datetimeFigureOut">
               <a:rPr lang="en-US" smtClean="0"/>
-              <a:t>9/16/24</a:t>
+              <a:t>10/31/24</a:t>
             </a:fld>
             <a:endParaRPr lang="en-US"/>
           </a:p>
@@ -1623,7 +1623,7 @@
           <a:p>
             <a:fld id="{3EBFF84C-30FA-534C-A298-DE425FBFB86B}" type="datetimeFigureOut">
               <a:rPr lang="en-US" smtClean="0"/>
-              <a:t>9/16/24</a:t>
+              <a:t>10/31/24</a:t>
             </a:fld>
             <a:endParaRPr lang="en-US"/>
           </a:p>
@@ -1741,7 +1741,7 @@
           <a:p>
             <a:fld id="{3EBFF84C-30FA-534C-A298-DE425FBFB86B}" type="datetimeFigureOut">
               <a:rPr lang="en-US" smtClean="0"/>
-              <a:t>9/16/24</a:t>
+              <a:t>10/31/24</a:t>
             </a:fld>
             <a:endParaRPr lang="en-US"/>
           </a:p>
@@ -1836,7 +1836,7 @@
           <a:p>
             <a:fld id="{3EBFF84C-30FA-534C-A298-DE425FBFB86B}" type="datetimeFigureOut">
               <a:rPr lang="en-US" smtClean="0"/>
-              <a:t>9/16/24</a:t>
+              <a:t>10/31/24</a:t>
             </a:fld>
             <a:endParaRPr lang="en-US"/>
           </a:p>
@@ -2113,7 +2113,7 @@
           <a:p>
             <a:fld id="{3EBFF84C-30FA-534C-A298-DE425FBFB86B}" type="datetimeFigureOut">
               <a:rPr lang="en-US" smtClean="0"/>
-              <a:t>9/16/24</a:t>
+              <a:t>10/31/24</a:t>
             </a:fld>
             <a:endParaRPr lang="en-US"/>
           </a:p>
@@ -2370,7 +2370,7 @@
           <a:p>
             <a:fld id="{3EBFF84C-30FA-534C-A298-DE425FBFB86B}" type="datetimeFigureOut">
               <a:rPr lang="en-US" smtClean="0"/>
-              <a:t>9/16/24</a:t>
+              <a:t>10/31/24</a:t>
             </a:fld>
             <a:endParaRPr lang="en-US"/>
           </a:p>
@@ -2583,7 +2583,7 @@
           <a:p>
             <a:fld id="{3EBFF84C-30FA-534C-A298-DE425FBFB86B}" type="datetimeFigureOut">
               <a:rPr lang="en-US" smtClean="0"/>
-              <a:t>9/16/24</a:t>
+              <a:t>10/31/24</a:t>
             </a:fld>
             <a:endParaRPr lang="en-US"/>
           </a:p>
@@ -47925,7 +47925,7 @@
                 <a:latin typeface="Arial" panose="020B0604020202020204" pitchFamily="34" charset="0"/>
                 <a:cs typeface="Arial" panose="020B0604020202020204" pitchFamily="34" charset="0"/>
               </a:rPr>
-              <a:t>TT24_231</a:t>
+              <a:t>TT24_232</a:t>
             </a:r>
           </a:p>
         </p:txBody>
@@ -47963,7 +47963,7 @@
                 <a:latin typeface="Arial" panose="020B0604020202020204" pitchFamily="34" charset="0"/>
                 <a:cs typeface="Arial" panose="020B0604020202020204" pitchFamily="34" charset="0"/>
               </a:rPr>
-              <a:t>TT24_232</a:t>
+              <a:t>TT24_231</a:t>
             </a:r>
           </a:p>
         </p:txBody>

</xml_diff>